<commit_message>
diagrama de solução atualizado
</commit_message>
<xml_diff>
--- a/DIAGRAMS/diagramaSolucao.pptx
+++ b/DIAGRAMS/diagramaSolucao.pptx
@@ -2,10 +2,10 @@
 <file path=ppt/presentation.xml><?xml version="1.0" encoding="utf-8"?>
 <p:presentation xmlns:a="http://schemas.openxmlformats.org/drawingml/2006/main" xmlns:r="http://schemas.openxmlformats.org/officeDocument/2006/relationships" xmlns:p="http://schemas.openxmlformats.org/presentationml/2006/main" saveSubsetFonts="1">
   <p:sldMasterIdLst>
-    <p:sldMasterId id="2147483648" r:id="rId1"/>
+    <p:sldMasterId id="2147483648" r:id="rId3"/>
   </p:sldMasterIdLst>
   <p:sldIdLst>
-    <p:sldId id="256" r:id="rId2"/>
+    <p:sldId id="256" r:id="rId4"/>
   </p:sldIdLst>
   <p:sldSz cx="12192000" cy="6858000"/>
   <p:notesSz cx="6858000" cy="9144000"/>
@@ -104,6 +104,11 @@
       </a:defRPr>
     </a:lvl9pPr>
   </p:defaultTextStyle>
+  <p:extLst>
+    <p:ext uri="{EFAFB233-063F-42B5-8137-9DF3F51BA10A}">
+      <p15:sldGuideLst xmlns:p15="http://schemas.microsoft.com/office/powerpoint/2012/main"/>
+    </p:ext>
+  </p:extLst>
 </p:presentation>
 </file>
 
@@ -254,7 +259,7 @@
           <a:p>
             <a:fld id="{4FA529B5-CAA8-4198-AEC0-DDF24B9B502D}" type="datetimeFigureOut">
               <a:rPr lang="en-US" smtClean="0"/>
-              <a:t>9/4/2022</a:t>
+              <a:t>10/13/2022</a:t>
             </a:fld>
             <a:endParaRPr lang="en-US"/>
           </a:p>
@@ -452,7 +457,7 @@
           <a:p>
             <a:fld id="{4FA529B5-CAA8-4198-AEC0-DDF24B9B502D}" type="datetimeFigureOut">
               <a:rPr lang="en-US" smtClean="0"/>
-              <a:t>9/4/2022</a:t>
+              <a:t>10/13/2022</a:t>
             </a:fld>
             <a:endParaRPr lang="en-US"/>
           </a:p>
@@ -660,7 +665,7 @@
           <a:p>
             <a:fld id="{4FA529B5-CAA8-4198-AEC0-DDF24B9B502D}" type="datetimeFigureOut">
               <a:rPr lang="en-US" smtClean="0"/>
-              <a:t>9/4/2022</a:t>
+              <a:t>10/13/2022</a:t>
             </a:fld>
             <a:endParaRPr lang="en-US"/>
           </a:p>
@@ -858,7 +863,7 @@
           <a:p>
             <a:fld id="{4FA529B5-CAA8-4198-AEC0-DDF24B9B502D}" type="datetimeFigureOut">
               <a:rPr lang="en-US" smtClean="0"/>
-              <a:t>9/4/2022</a:t>
+              <a:t>10/13/2022</a:t>
             </a:fld>
             <a:endParaRPr lang="en-US"/>
           </a:p>
@@ -1133,7 +1138,7 @@
           <a:p>
             <a:fld id="{4FA529B5-CAA8-4198-AEC0-DDF24B9B502D}" type="datetimeFigureOut">
               <a:rPr lang="en-US" smtClean="0"/>
-              <a:t>9/4/2022</a:t>
+              <a:t>10/13/2022</a:t>
             </a:fld>
             <a:endParaRPr lang="en-US"/>
           </a:p>
@@ -1398,7 +1403,7 @@
           <a:p>
             <a:fld id="{4FA529B5-CAA8-4198-AEC0-DDF24B9B502D}" type="datetimeFigureOut">
               <a:rPr lang="en-US" smtClean="0"/>
-              <a:t>9/4/2022</a:t>
+              <a:t>10/13/2022</a:t>
             </a:fld>
             <a:endParaRPr lang="en-US"/>
           </a:p>
@@ -1810,7 +1815,7 @@
           <a:p>
             <a:fld id="{4FA529B5-CAA8-4198-AEC0-DDF24B9B502D}" type="datetimeFigureOut">
               <a:rPr lang="en-US" smtClean="0"/>
-              <a:t>9/4/2022</a:t>
+              <a:t>10/13/2022</a:t>
             </a:fld>
             <a:endParaRPr lang="en-US"/>
           </a:p>
@@ -1951,7 +1956,7 @@
           <a:p>
             <a:fld id="{4FA529B5-CAA8-4198-AEC0-DDF24B9B502D}" type="datetimeFigureOut">
               <a:rPr lang="en-US" smtClean="0"/>
-              <a:t>9/4/2022</a:t>
+              <a:t>10/13/2022</a:t>
             </a:fld>
             <a:endParaRPr lang="en-US"/>
           </a:p>
@@ -2064,7 +2069,7 @@
           <a:p>
             <a:fld id="{4FA529B5-CAA8-4198-AEC0-DDF24B9B502D}" type="datetimeFigureOut">
               <a:rPr lang="en-US" smtClean="0"/>
-              <a:t>9/4/2022</a:t>
+              <a:t>10/13/2022</a:t>
             </a:fld>
             <a:endParaRPr lang="en-US"/>
           </a:p>
@@ -2375,7 +2380,7 @@
           <a:p>
             <a:fld id="{4FA529B5-CAA8-4198-AEC0-DDF24B9B502D}" type="datetimeFigureOut">
               <a:rPr lang="en-US" smtClean="0"/>
-              <a:t>9/4/2022</a:t>
+              <a:t>10/13/2022</a:t>
             </a:fld>
             <a:endParaRPr lang="en-US"/>
           </a:p>
@@ -2663,7 +2668,7 @@
           <a:p>
             <a:fld id="{4FA529B5-CAA8-4198-AEC0-DDF24B9B502D}" type="datetimeFigureOut">
               <a:rPr lang="en-US" smtClean="0"/>
-              <a:t>9/4/2022</a:t>
+              <a:t>10/13/2022</a:t>
             </a:fld>
             <a:endParaRPr lang="en-US"/>
           </a:p>
@@ -2904,7 +2909,7 @@
           <a:p>
             <a:fld id="{4FA529B5-CAA8-4198-AEC0-DDF24B9B502D}" type="datetimeFigureOut">
               <a:rPr lang="en-US" smtClean="0"/>
-              <a:t>9/4/2022</a:t>
+              <a:t>10/13/2022</a:t>
             </a:fld>
             <a:endParaRPr lang="en-US"/>
           </a:p>
@@ -2997,6 +3002,53 @@
               <a:t>‹#›</a:t>
             </a:fld>
             <a:endParaRPr lang="en-US"/>
+          </a:p>
+        </p:txBody>
+      </p:sp>
+      <p:sp>
+        <p:nvSpPr>
+          <p:cNvPr id="8" name="CaixaDeTexto 7">
+            <a:extLst>
+              <a:ext uri="{FF2B5EF4-FFF2-40B4-BE49-F238E27FC236}">
+                <a16:creationId xmlns:a16="http://schemas.microsoft.com/office/drawing/2014/main" id="{AA3CA390-0EA9-04B1-BEC3-764E857ED894}"/>
+              </a:ext>
+            </a:extLst>
+          </p:cNvPr>
+          <p:cNvSpPr txBox="1"/>
+          <p:nvPr userDrawn="1">
+            <p:extLst>
+              <p:ext uri="{1162E1C5-73C7-4A58-AE30-91384D911F3F}">
+                <p184:classification xmlns:p184="http://schemas.microsoft.com/office/powerpoint/2018/4/main" val="ftr"/>
+              </p:ext>
+            </p:extLst>
+          </p:nvPr>
+        </p:nvSpPr>
+        <p:spPr>
+          <a:xfrm>
+            <a:off x="0" y="6705600"/>
+            <a:ext cx="1112838" cy="152400"/>
+          </a:xfrm>
+          <a:prstGeom prst="rect">
+            <a:avLst/>
+          </a:prstGeom>
+        </p:spPr>
+        <p:txBody>
+          <a:bodyPr horzOverflow="overflow" lIns="0" tIns="0" rIns="0" bIns="0">
+            <a:spAutoFit/>
+          </a:bodyPr>
+          <a:lstStyle/>
+          <a:p>
+            <a:pPr algn="l"/>
+            <a:r>
+              <a:rPr lang="pt-BR" sz="1000">
+                <a:solidFill>
+                  <a:srgbClr val="000000"/>
+                </a:solidFill>
+                <a:latin typeface="Calibri" panose="020F0502020204030204" pitchFamily="34" charset="0"/>
+                <a:cs typeface="Calibri" panose="020F0502020204030204" pitchFamily="34" charset="0"/>
+              </a:rPr>
+              <a:t>Classificação: Interna</a:t>
+            </a:r>
           </a:p>
         </p:txBody>
       </p:sp>
@@ -3391,8 +3443,8 @@
         </p:nvSpPr>
         <p:spPr>
           <a:xfrm rot="10800000">
-            <a:off x="2221907" y="-1567872"/>
-            <a:ext cx="7624420" cy="4257964"/>
+            <a:off x="687419" y="-510337"/>
+            <a:ext cx="10752337" cy="4257964"/>
           </a:xfrm>
           <a:prstGeom prst="triangle">
             <a:avLst/>
@@ -3462,8 +3514,8 @@
         </p:blipFill>
         <p:spPr bwMode="auto">
           <a:xfrm>
-            <a:off x="5442271" y="2339589"/>
-            <a:ext cx="1307455" cy="1307455"/>
+            <a:off x="5722212" y="1881471"/>
+            <a:ext cx="747569" cy="868640"/>
           </a:xfrm>
           <a:prstGeom prst="rect">
             <a:avLst/>
@@ -3509,7 +3561,7 @@
         </p:blipFill>
         <p:spPr bwMode="auto">
           <a:xfrm>
-            <a:off x="4983138" y="258267"/>
+            <a:off x="4988064" y="869476"/>
             <a:ext cx="420255" cy="420255"/>
           </a:xfrm>
           <a:prstGeom prst="rect">
@@ -3556,7 +3608,7 @@
         </p:blipFill>
         <p:spPr bwMode="auto">
           <a:xfrm>
-            <a:off x="4793792" y="687757"/>
+            <a:off x="4759626" y="1291470"/>
             <a:ext cx="420255" cy="420255"/>
           </a:xfrm>
           <a:prstGeom prst="rect">
@@ -3603,7 +3655,7 @@
         </p:blipFill>
         <p:spPr bwMode="auto">
           <a:xfrm>
-            <a:off x="5163248" y="687758"/>
+            <a:off x="5150760" y="1293293"/>
             <a:ext cx="420255" cy="420255"/>
           </a:xfrm>
           <a:prstGeom prst="rect">
@@ -3650,7 +3702,7 @@
         </p:blipFill>
         <p:spPr bwMode="auto">
           <a:xfrm>
-            <a:off x="5938402" y="1179438"/>
+            <a:off x="5938402" y="921754"/>
             <a:ext cx="315191" cy="315191"/>
           </a:xfrm>
           <a:prstGeom prst="rect">
@@ -3697,7 +3749,7 @@
         </p:blipFill>
         <p:spPr bwMode="auto">
           <a:xfrm>
-            <a:off x="6791034" y="678522"/>
+            <a:off x="6683881" y="864247"/>
             <a:ext cx="420255" cy="420255"/>
           </a:xfrm>
           <a:prstGeom prst="rect">
@@ -3885,9 +3937,9 @@
           <p:nvPr/>
         </p:nvCxnSpPr>
         <p:spPr>
-          <a:xfrm rot="16200000" flipH="1">
-            <a:off x="5673518" y="1917108"/>
-            <a:ext cx="844960" cy="1"/>
+          <a:xfrm rot="5400000">
+            <a:off x="5773735" y="1559208"/>
+            <a:ext cx="644526" cy="1"/>
           </a:xfrm>
           <a:prstGeom prst="bentConnector3">
             <a:avLst/>
@@ -3928,9 +3980,9 @@
           <p:nvPr/>
         </p:nvCxnSpPr>
         <p:spPr>
-          <a:xfrm rot="10800000">
-            <a:off x="5403394" y="468396"/>
-            <a:ext cx="535009" cy="868639"/>
+          <a:xfrm rot="10800000" flipV="1">
+            <a:off x="5408320" y="1079350"/>
+            <a:ext cx="530083" cy="254"/>
           </a:xfrm>
           <a:prstGeom prst="bentConnector3">
             <a:avLst/>
@@ -3966,19 +4018,18 @@
           <p:cNvCxnSpPr>
             <a:cxnSpLocks/>
             <a:stCxn id="1034" idx="3"/>
-            <a:endCxn id="1036" idx="0"/>
+            <a:endCxn id="1036" idx="1"/>
           </p:cNvCxnSpPr>
           <p:nvPr/>
         </p:nvCxnSpPr>
         <p:spPr>
           <a:xfrm flipV="1">
-            <a:off x="6253593" y="678522"/>
-            <a:ext cx="747569" cy="658512"/>
-          </a:xfrm>
-          <a:prstGeom prst="bentConnector4">
+            <a:off x="6253593" y="1074375"/>
+            <a:ext cx="430288" cy="4975"/>
+          </a:xfrm>
+          <a:prstGeom prst="bentConnector3">
             <a:avLst>
-              <a:gd name="adj1" fmla="val 35946"/>
-              <a:gd name="adj2" fmla="val 134715"/>
+              <a:gd name="adj1" fmla="val 50000"/>
             </a:avLst>
           </a:prstGeom>
           <a:ln w="19050">
@@ -4377,8 +4428,8 @@
         </p:nvCxnSpPr>
         <p:spPr>
           <a:xfrm rot="10800000">
-            <a:off x="6749726" y="2993318"/>
-            <a:ext cx="1541794" cy="998233"/>
+            <a:off x="6469782" y="2315792"/>
+            <a:ext cx="1821739" cy="1675759"/>
           </a:xfrm>
           <a:prstGeom prst="bentConnector3">
             <a:avLst/>
@@ -4387,7 +4438,7 @@
             <a:solidFill>
               <a:schemeClr val="accent2"/>
             </a:solidFill>
-            <a:headEnd type="arrow" w="med" len="med"/>
+            <a:headEnd type="none" w="med" len="med"/>
             <a:tailEnd type="arrow" w="med" len="med"/>
           </a:ln>
         </p:spPr>
@@ -4423,14 +4474,14 @@
         </p:nvCxnSpPr>
         <p:spPr>
           <a:xfrm flipV="1">
-            <a:off x="3711388" y="2993317"/>
-            <a:ext cx="1730883" cy="1066094"/>
+            <a:off x="3711388" y="2315791"/>
+            <a:ext cx="2010824" cy="1743620"/>
           </a:xfrm>
           <a:prstGeom prst="bentConnector3">
             <a:avLst/>
           </a:prstGeom>
           <a:ln w="28575">
-            <a:headEnd type="arrow" w="med" len="med"/>
+            <a:headEnd type="none" w="med" len="med"/>
             <a:tailEnd type="arrow" w="med" len="med"/>
           </a:ln>
         </p:spPr>
@@ -4557,7 +4608,7 @@
         </p:nvSpPr>
         <p:spPr>
           <a:xfrm>
-            <a:off x="5216456" y="3425833"/>
+            <a:off x="5216454" y="2750112"/>
             <a:ext cx="1786023" cy="461665"/>
           </a:xfrm>
           <a:prstGeom prst="rect">
@@ -4629,6 +4680,227 @@
               <a:srgbClr val="FF1616"/>
             </a:solidFill>
           </a:ln>
+        </p:spPr>
+      </p:pic>
+      <p:cxnSp>
+        <p:nvCxnSpPr>
+          <p:cNvPr id="29" name="Connector: Elbow 19">
+            <a:extLst>
+              <a:ext uri="{FF2B5EF4-FFF2-40B4-BE49-F238E27FC236}">
+                <a16:creationId xmlns:a16="http://schemas.microsoft.com/office/drawing/2014/main" id="{071EB565-DD6A-4E44-F087-EA8E59572116}"/>
+              </a:ext>
+            </a:extLst>
+          </p:cNvPr>
+          <p:cNvCxnSpPr>
+            <a:cxnSpLocks/>
+            <a:stCxn id="1034" idx="0"/>
+            <a:endCxn id="61" idx="2"/>
+          </p:cNvCxnSpPr>
+          <p:nvPr/>
+        </p:nvCxnSpPr>
+        <p:spPr>
+          <a:xfrm rot="16200000" flipV="1">
+            <a:off x="5910311" y="736067"/>
+            <a:ext cx="371373" cy="2"/>
+          </a:xfrm>
+          <a:prstGeom prst="bentConnector3">
+            <a:avLst>
+              <a:gd name="adj1" fmla="val 50000"/>
+            </a:avLst>
+          </a:prstGeom>
+          <a:ln w="19050">
+            <a:prstDash val="sysDash"/>
+          </a:ln>
+        </p:spPr>
+        <p:style>
+          <a:lnRef idx="1">
+            <a:schemeClr val="accent6"/>
+          </a:lnRef>
+          <a:fillRef idx="0">
+            <a:schemeClr val="accent6"/>
+          </a:fillRef>
+          <a:effectRef idx="0">
+            <a:schemeClr val="accent6"/>
+          </a:effectRef>
+          <a:fontRef idx="minor">
+            <a:schemeClr val="tx1"/>
+          </a:fontRef>
+        </p:style>
+      </p:cxnSp>
+      <p:pic>
+        <p:nvPicPr>
+          <p:cNvPr id="61" name="Imagem 60">
+            <a:extLst>
+              <a:ext uri="{FF2B5EF4-FFF2-40B4-BE49-F238E27FC236}">
+                <a16:creationId xmlns:a16="http://schemas.microsoft.com/office/drawing/2014/main" id="{6E92B042-1578-DBC4-2B1D-77AA8620D7B8}"/>
+              </a:ext>
+            </a:extLst>
+          </p:cNvPr>
+          <p:cNvPicPr>
+            <a:picLocks noChangeAspect="1"/>
+          </p:cNvPicPr>
+          <p:nvPr/>
+        </p:nvPicPr>
+        <p:blipFill>
+          <a:blip r:embed="rId19">
+            <a:extLst>
+              <a:ext uri="{28A0092B-C50C-407E-A947-70E740481C1C}">
+                <a14:useLocalDpi xmlns:a14="http://schemas.microsoft.com/office/drawing/2010/main" val="0"/>
+              </a:ext>
+            </a:extLst>
+          </a:blip>
+          <a:stretch>
+            <a:fillRect/>
+          </a:stretch>
+        </p:blipFill>
+        <p:spPr>
+          <a:xfrm>
+            <a:off x="5888343" y="135076"/>
+            <a:ext cx="415305" cy="415305"/>
+          </a:xfrm>
+          <a:prstGeom prst="rect">
+            <a:avLst/>
+          </a:prstGeom>
+        </p:spPr>
+      </p:pic>
+      <p:sp>
+        <p:nvSpPr>
+          <p:cNvPr id="1029" name="CaixaDeTexto 1028">
+            <a:extLst>
+              <a:ext uri="{FF2B5EF4-FFF2-40B4-BE49-F238E27FC236}">
+                <a16:creationId xmlns:a16="http://schemas.microsoft.com/office/drawing/2014/main" id="{C7F932C0-D50D-D4B7-6FFD-9783F5E79228}"/>
+              </a:ext>
+            </a:extLst>
+          </p:cNvPr>
+          <p:cNvSpPr txBox="1"/>
+          <p:nvPr/>
+        </p:nvSpPr>
+        <p:spPr>
+          <a:xfrm>
+            <a:off x="2841674" y="2996418"/>
+            <a:ext cx="184731" cy="369332"/>
+          </a:xfrm>
+          <a:prstGeom prst="rect">
+            <a:avLst/>
+          </a:prstGeom>
+          <a:noFill/>
+        </p:spPr>
+        <p:txBody>
+          <a:bodyPr wrap="none" rtlCol="0">
+            <a:spAutoFit/>
+          </a:bodyPr>
+          <a:lstStyle/>
+          <a:p>
+            <a:endParaRPr lang="pt-BR" dirty="0"/>
+          </a:p>
+        </p:txBody>
+      </p:sp>
+      <p:pic>
+        <p:nvPicPr>
+          <p:cNvPr id="1033" name="Imagem 1032">
+            <a:extLst>
+              <a:ext uri="{FF2B5EF4-FFF2-40B4-BE49-F238E27FC236}">
+                <a16:creationId xmlns:a16="http://schemas.microsoft.com/office/drawing/2014/main" id="{77CD88E3-F543-91B6-CD24-D931022320B4}"/>
+              </a:ext>
+            </a:extLst>
+          </p:cNvPr>
+          <p:cNvPicPr>
+            <a:picLocks noChangeAspect="1"/>
+          </p:cNvPicPr>
+          <p:nvPr/>
+        </p:nvPicPr>
+        <p:blipFill>
+          <a:blip r:embed="rId20">
+            <a:extLst>
+              <a:ext uri="{28A0092B-C50C-407E-A947-70E740481C1C}">
+                <a14:useLocalDpi xmlns:a14="http://schemas.microsoft.com/office/drawing/2010/main" val="0"/>
+              </a:ext>
+            </a:extLst>
+          </a:blip>
+          <a:stretch>
+            <a:fillRect/>
+          </a:stretch>
+        </p:blipFill>
+        <p:spPr>
+          <a:xfrm>
+            <a:off x="8496905" y="4617036"/>
+            <a:ext cx="538425" cy="538425"/>
+          </a:xfrm>
+          <a:prstGeom prst="rect">
+            <a:avLst/>
+          </a:prstGeom>
+        </p:spPr>
+      </p:pic>
+      <p:pic>
+        <p:nvPicPr>
+          <p:cNvPr id="1037" name="Imagem 1036">
+            <a:extLst>
+              <a:ext uri="{FF2B5EF4-FFF2-40B4-BE49-F238E27FC236}">
+                <a16:creationId xmlns:a16="http://schemas.microsoft.com/office/drawing/2014/main" id="{76E70F41-34B9-4B68-DA20-B4FE8DE7D137}"/>
+              </a:ext>
+            </a:extLst>
+          </p:cNvPr>
+          <p:cNvPicPr>
+            <a:picLocks noChangeAspect="1"/>
+          </p:cNvPicPr>
+          <p:nvPr/>
+        </p:nvPicPr>
+        <p:blipFill>
+          <a:blip r:embed="rId21">
+            <a:extLst>
+              <a:ext uri="{28A0092B-C50C-407E-A947-70E740481C1C}">
+                <a14:useLocalDpi xmlns:a14="http://schemas.microsoft.com/office/drawing/2010/main" val="0"/>
+              </a:ext>
+            </a:extLst>
+          </a:blip>
+          <a:stretch>
+            <a:fillRect/>
+          </a:stretch>
+        </p:blipFill>
+        <p:spPr>
+          <a:xfrm>
+            <a:off x="2680862" y="3400781"/>
+            <a:ext cx="377314" cy="377314"/>
+          </a:xfrm>
+          <a:prstGeom prst="rect">
+            <a:avLst/>
+          </a:prstGeom>
+        </p:spPr>
+      </p:pic>
+      <p:pic>
+        <p:nvPicPr>
+          <p:cNvPr id="1041" name="Imagem 1040">
+            <a:extLst>
+              <a:ext uri="{FF2B5EF4-FFF2-40B4-BE49-F238E27FC236}">
+                <a16:creationId xmlns:a16="http://schemas.microsoft.com/office/drawing/2014/main" id="{737FFE73-16BF-130A-16A8-581638B85368}"/>
+              </a:ext>
+            </a:extLst>
+          </p:cNvPr>
+          <p:cNvPicPr>
+            <a:picLocks noChangeAspect="1"/>
+          </p:cNvPicPr>
+          <p:nvPr/>
+        </p:nvPicPr>
+        <p:blipFill>
+          <a:blip r:embed="rId22">
+            <a:extLst>
+              <a:ext uri="{28A0092B-C50C-407E-A947-70E740481C1C}">
+                <a14:useLocalDpi xmlns:a14="http://schemas.microsoft.com/office/drawing/2010/main" val="0"/>
+              </a:ext>
+            </a:extLst>
+          </a:blip>
+          <a:stretch>
+            <a:fillRect/>
+          </a:stretch>
+        </p:blipFill>
+        <p:spPr>
+          <a:xfrm>
+            <a:off x="2320910" y="3364401"/>
+            <a:ext cx="377314" cy="377314"/>
+          </a:xfrm>
+          <a:prstGeom prst="rect">
+            <a:avLst/>
+          </a:prstGeom>
         </p:spPr>
       </p:pic>
     </p:spTree>
@@ -4937,4 +5209,217 @@
     </a:ext>
   </a:extLst>
 </a:theme>
+</file>
+
+<file path=customXml/item1.xml><?xml version="1.0" encoding="utf-8"?>
+<?mso-contentType ?>
+<FormTemplates xmlns="http://schemas.microsoft.com/sharepoint/v3/contenttype/forms">
+  <Display>DocumentLibraryForm</Display>
+  <Edit>DocumentLibraryForm</Edit>
+  <New>DocumentLibraryForm</New>
+</FormTemplates>
+</file>
+
+<file path=customXml/item2.xml><?xml version="1.0" encoding="utf-8"?>
+<ct:contentTypeSchema xmlns:ct="http://schemas.microsoft.com/office/2006/metadata/contentType" xmlns:ma="http://schemas.microsoft.com/office/2006/metadata/properties/metaAttributes" ct:_="" ma:_="" ma:contentTypeName="Document" ma:contentTypeID="0x0101007ACFDD1B2CAD7546B60E55C07A86393C" ma:contentTypeVersion="8" ma:contentTypeDescription="Create a new document." ma:contentTypeScope="" ma:versionID="5d6d35b7c4b9d7d0b0b50153092a7135">
+  <xsd:schema xmlns:xsd="http://www.w3.org/2001/XMLSchema" xmlns:xs="http://www.w3.org/2001/XMLSchema" xmlns:p="http://schemas.microsoft.com/office/2006/metadata/properties" xmlns:ns2="93df9749-2e2e-4b03-97b6-02f28a4f49b8" xmlns:ns3="baec3224-d2f5-41eb-8c54-338f5702dece" targetNamespace="http://schemas.microsoft.com/office/2006/metadata/properties" ma:root="true" ma:fieldsID="aabd4abe893933e4b2ec8d888e542e07" ns2:_="" ns3:_="">
+    <xsd:import namespace="93df9749-2e2e-4b03-97b6-02f28a4f49b8"/>
+    <xsd:import namespace="baec3224-d2f5-41eb-8c54-338f5702dece"/>
+    <xsd:element name="properties">
+      <xsd:complexType>
+        <xsd:sequence>
+          <xsd:element name="documentManagement">
+            <xsd:complexType>
+              <xsd:all>
+                <xsd:element ref="ns2:MediaServiceMetadata" minOccurs="0"/>
+                <xsd:element ref="ns2:MediaServiceFastMetadata" minOccurs="0"/>
+                <xsd:element ref="ns2:lcf76f155ced4ddcb4097134ff3c332f" minOccurs="0"/>
+                <xsd:element ref="ns3:TaxCatchAll" minOccurs="0"/>
+                <xsd:element ref="ns2:MediaServiceOCR" minOccurs="0"/>
+                <xsd:element ref="ns2:MediaServiceGenerationTime" minOccurs="0"/>
+                <xsd:element ref="ns2:MediaServiceEventHashCode" minOccurs="0"/>
+              </xsd:all>
+            </xsd:complexType>
+          </xsd:element>
+        </xsd:sequence>
+      </xsd:complexType>
+    </xsd:element>
+  </xsd:schema>
+  <xsd:schema xmlns:xsd="http://www.w3.org/2001/XMLSchema" xmlns:xs="http://www.w3.org/2001/XMLSchema" xmlns:dms="http://schemas.microsoft.com/office/2006/documentManagement/types" xmlns:pc="http://schemas.microsoft.com/office/infopath/2007/PartnerControls" targetNamespace="93df9749-2e2e-4b03-97b6-02f28a4f49b8" elementFormDefault="qualified">
+    <xsd:import namespace="http://schemas.microsoft.com/office/2006/documentManagement/types"/>
+    <xsd:import namespace="http://schemas.microsoft.com/office/infopath/2007/PartnerControls"/>
+    <xsd:element name="MediaServiceMetadata" ma:index="8" nillable="true" ma:displayName="MediaServiceMetadata" ma:hidden="true" ma:internalName="MediaServiceMetadata" ma:readOnly="true">
+      <xsd:simpleType>
+        <xsd:restriction base="dms:Note"/>
+      </xsd:simpleType>
+    </xsd:element>
+    <xsd:element name="MediaServiceFastMetadata" ma:index="9" nillable="true" ma:displayName="MediaServiceFastMetadata" ma:hidden="true" ma:internalName="MediaServiceFastMetadata" ma:readOnly="true">
+      <xsd:simpleType>
+        <xsd:restriction base="dms:Note"/>
+      </xsd:simpleType>
+    </xsd:element>
+    <xsd:element name="lcf76f155ced4ddcb4097134ff3c332f" ma:index="11" nillable="true" ma:taxonomy="true" ma:internalName="lcf76f155ced4ddcb4097134ff3c332f" ma:taxonomyFieldName="MediaServiceImageTags" ma:displayName="Image Tags" ma:readOnly="false" ma:fieldId="{5cf76f15-5ced-4ddc-b409-7134ff3c332f}" ma:taxonomyMulti="true" ma:sspId="7b9497d1-976c-460c-b354-1ae52b23e8cc" ma:termSetId="09814cd3-568e-fe90-9814-8d621ff8fb84" ma:anchorId="fba54fb3-c3e1-fe81-a776-ca4b69148c4d" ma:open="true" ma:isKeyword="false">
+      <xsd:complexType>
+        <xsd:sequence>
+          <xsd:element ref="pc:Terms" minOccurs="0" maxOccurs="1"/>
+        </xsd:sequence>
+      </xsd:complexType>
+    </xsd:element>
+    <xsd:element name="MediaServiceOCR" ma:index="13" nillable="true" ma:displayName="Extracted Text" ma:internalName="MediaServiceOCR" ma:readOnly="true">
+      <xsd:simpleType>
+        <xsd:restriction base="dms:Note">
+          <xsd:maxLength value="255"/>
+        </xsd:restriction>
+      </xsd:simpleType>
+    </xsd:element>
+    <xsd:element name="MediaServiceGenerationTime" ma:index="14" nillable="true" ma:displayName="MediaServiceGenerationTime" ma:hidden="true" ma:internalName="MediaServiceGenerationTime" ma:readOnly="true">
+      <xsd:simpleType>
+        <xsd:restriction base="dms:Text"/>
+      </xsd:simpleType>
+    </xsd:element>
+    <xsd:element name="MediaServiceEventHashCode" ma:index="15" nillable="true" ma:displayName="MediaServiceEventHashCode" ma:hidden="true" ma:internalName="MediaServiceEventHashCode" ma:readOnly="true">
+      <xsd:simpleType>
+        <xsd:restriction base="dms:Text"/>
+      </xsd:simpleType>
+    </xsd:element>
+  </xsd:schema>
+  <xsd:schema xmlns:xsd="http://www.w3.org/2001/XMLSchema" xmlns:xs="http://www.w3.org/2001/XMLSchema" xmlns:dms="http://schemas.microsoft.com/office/2006/documentManagement/types" xmlns:pc="http://schemas.microsoft.com/office/infopath/2007/PartnerControls" targetNamespace="baec3224-d2f5-41eb-8c54-338f5702dece" elementFormDefault="qualified">
+    <xsd:import namespace="http://schemas.microsoft.com/office/2006/documentManagement/types"/>
+    <xsd:import namespace="http://schemas.microsoft.com/office/infopath/2007/PartnerControls"/>
+    <xsd:element name="TaxCatchAll" ma:index="12" nillable="true" ma:displayName="Taxonomy Catch All Column" ma:hidden="true" ma:list="{1b3f875f-ca17-49ba-a570-8a21ff601526}" ma:internalName="TaxCatchAll" ma:showField="CatchAllData" ma:web="baec3224-d2f5-41eb-8c54-338f5702dece">
+      <xsd:complexType>
+        <xsd:complexContent>
+          <xsd:extension base="dms:MultiChoiceLookup">
+            <xsd:sequence>
+              <xsd:element name="Value" type="dms:Lookup" maxOccurs="unbounded" minOccurs="0" nillable="true"/>
+            </xsd:sequence>
+          </xsd:extension>
+        </xsd:complexContent>
+      </xsd:complexType>
+    </xsd:element>
+  </xsd:schema>
+  <xsd:schema xmlns="http://schemas.openxmlformats.org/package/2006/metadata/core-properties" xmlns:xsd="http://www.w3.org/2001/XMLSchema" xmlns:xsi="http://www.w3.org/2001/XMLSchema-instance" xmlns:dc="http://purl.org/dc/elements/1.1/" xmlns:dcterms="http://purl.org/dc/terms/" xmlns:odoc="http://schemas.microsoft.com/internal/obd" targetNamespace="http://schemas.openxmlformats.org/package/2006/metadata/core-properties" elementFormDefault="qualified" attributeFormDefault="unqualified" blockDefault="#all">
+    <xsd:import namespace="http://purl.org/dc/elements/1.1/" schemaLocation="http://dublincore.org/schemas/xmls/qdc/2003/04/02/dc.xsd"/>
+    <xsd:import namespace="http://purl.org/dc/terms/" schemaLocation="http://dublincore.org/schemas/xmls/qdc/2003/04/02/dcterms.xsd"/>
+    <xsd:element name="coreProperties" type="CT_coreProperties"/>
+    <xsd:complexType name="CT_coreProperties">
+      <xsd:all>
+        <xsd:element ref="dc:creator" minOccurs="0" maxOccurs="1"/>
+        <xsd:element ref="dcterms:created" minOccurs="0" maxOccurs="1"/>
+        <xsd:element ref="dc:identifier" minOccurs="0" maxOccurs="1"/>
+        <xsd:element name="contentType" minOccurs="0" maxOccurs="1" type="xsd:string" ma:index="0" ma:displayName="Content Type"/>
+        <xsd:element ref="dc:title" minOccurs="0" maxOccurs="1" ma:index="4" ma:displayName="Title"/>
+        <xsd:element ref="dc:subject" minOccurs="0" maxOccurs="1"/>
+        <xsd:element ref="dc:description" minOccurs="0" maxOccurs="1"/>
+        <xsd:element name="keywords" minOccurs="0" maxOccurs="1" type="xsd:string"/>
+        <xsd:element ref="dc:language" minOccurs="0" maxOccurs="1"/>
+        <xsd:element name="category" minOccurs="0" maxOccurs="1" type="xsd:string"/>
+        <xsd:element name="version" minOccurs="0" maxOccurs="1" type="xsd:string"/>
+        <xsd:element name="revision" minOccurs="0" maxOccurs="1" type="xsd:string">
+          <xsd:annotation>
+            <xsd:documentation>
+                        This value indicates the number of saves or revisions. The application is responsible for updating this value after each revision.
+                    </xsd:documentation>
+          </xsd:annotation>
+        </xsd:element>
+        <xsd:element name="lastModifiedBy" minOccurs="0" maxOccurs="1" type="xsd:string"/>
+        <xsd:element ref="dcterms:modified" minOccurs="0" maxOccurs="1"/>
+        <xsd:element name="contentStatus" minOccurs="0" maxOccurs="1" type="xsd:string"/>
+      </xsd:all>
+    </xsd:complexType>
+  </xsd:schema>
+  <xs:schema xmlns:pc="http://schemas.microsoft.com/office/infopath/2007/PartnerControls" xmlns:xs="http://www.w3.org/2001/XMLSchema" targetNamespace="http://schemas.microsoft.com/office/infopath/2007/PartnerControls" elementFormDefault="qualified" attributeFormDefault="unqualified">
+    <xs:element name="Person">
+      <xs:complexType>
+        <xs:sequence>
+          <xs:element ref="pc:DisplayName" minOccurs="0"/>
+          <xs:element ref="pc:AccountId" minOccurs="0"/>
+          <xs:element ref="pc:AccountType" minOccurs="0"/>
+        </xs:sequence>
+      </xs:complexType>
+    </xs:element>
+    <xs:element name="DisplayName" type="xs:string"/>
+    <xs:element name="AccountId" type="xs:string"/>
+    <xs:element name="AccountType" type="xs:string"/>
+    <xs:element name="BDCAssociatedEntity">
+      <xs:complexType>
+        <xs:sequence>
+          <xs:element ref="pc:BDCEntity" minOccurs="0" maxOccurs="unbounded"/>
+        </xs:sequence>
+        <xs:attribute ref="pc:EntityNamespace"/>
+        <xs:attribute ref="pc:EntityName"/>
+        <xs:attribute ref="pc:SystemInstanceName"/>
+        <xs:attribute ref="pc:AssociationName"/>
+      </xs:complexType>
+    </xs:element>
+    <xs:attribute name="EntityNamespace" type="xs:string"/>
+    <xs:attribute name="EntityName" type="xs:string"/>
+    <xs:attribute name="SystemInstanceName" type="xs:string"/>
+    <xs:attribute name="AssociationName" type="xs:string"/>
+    <xs:element name="BDCEntity">
+      <xs:complexType>
+        <xs:sequence>
+          <xs:element ref="pc:EntityDisplayName" minOccurs="0"/>
+          <xs:element ref="pc:EntityInstanceReference" minOccurs="0"/>
+          <xs:element ref="pc:EntityId1" minOccurs="0"/>
+          <xs:element ref="pc:EntityId2" minOccurs="0"/>
+          <xs:element ref="pc:EntityId3" minOccurs="0"/>
+          <xs:element ref="pc:EntityId4" minOccurs="0"/>
+          <xs:element ref="pc:EntityId5" minOccurs="0"/>
+        </xs:sequence>
+      </xs:complexType>
+    </xs:element>
+    <xs:element name="EntityDisplayName" type="xs:string"/>
+    <xs:element name="EntityInstanceReference" type="xs:string"/>
+    <xs:element name="EntityId1" type="xs:string"/>
+    <xs:element name="EntityId2" type="xs:string"/>
+    <xs:element name="EntityId3" type="xs:string"/>
+    <xs:element name="EntityId4" type="xs:string"/>
+    <xs:element name="EntityId5" type="xs:string"/>
+    <xs:element name="Terms">
+      <xs:complexType>
+        <xs:sequence>
+          <xs:element ref="pc:TermInfo" minOccurs="0" maxOccurs="unbounded"/>
+        </xs:sequence>
+      </xs:complexType>
+    </xs:element>
+    <xs:element name="TermInfo">
+      <xs:complexType>
+        <xs:sequence>
+          <xs:element ref="pc:TermName" minOccurs="0"/>
+          <xs:element ref="pc:TermId" minOccurs="0"/>
+        </xs:sequence>
+      </xs:complexType>
+    </xs:element>
+    <xs:element name="TermName" type="xs:string"/>
+    <xs:element name="TermId" type="xs:string"/>
+  </xs:schema>
+</ct:contentTypeSchema>
+</file>
+
+<file path=customXml/itemProps1.xml><?xml version="1.0" encoding="utf-8"?>
+<ds:datastoreItem xmlns:ds="http://schemas.openxmlformats.org/officeDocument/2006/customXml" ds:itemID="{0F87556E-BD60-49BB-A940-874BF0804AF5}">
+  <ds:schemaRefs>
+    <ds:schemaRef ds:uri="http://schemas.microsoft.com/sharepoint/v3/contenttype/forms"/>
+  </ds:schemaRefs>
+</ds:datastoreItem>
+</file>
+
+<file path=customXml/itemProps2.xml><?xml version="1.0" encoding="utf-8"?>
+<ds:datastoreItem xmlns:ds="http://schemas.openxmlformats.org/officeDocument/2006/customXml" ds:itemID="{37934C53-9D37-4ACF-8F44-22FD83A0E93C}">
+  <ds:schemaRefs>
+    <ds:schemaRef ds:uri="http://schemas.microsoft.com/office/2006/metadata/contentType"/>
+    <ds:schemaRef ds:uri="http://schemas.microsoft.com/office/2006/metadata/properties/metaAttributes"/>
+    <ds:schemaRef ds:uri="http://www.w3.org/2001/XMLSchema"/>
+    <ds:schemaRef ds:uri="http://schemas.microsoft.com/office/2006/metadata/properties"/>
+    <ds:schemaRef ds:uri="93df9749-2e2e-4b03-97b6-02f28a4f49b8"/>
+    <ds:schemaRef ds:uri="baec3224-d2f5-41eb-8c54-338f5702dece"/>
+    <ds:schemaRef ds:uri="http://schemas.microsoft.com/office/2006/documentManagement/types"/>
+    <ds:schemaRef ds:uri="http://schemas.microsoft.com/office/infopath/2007/PartnerControls"/>
+    <ds:schemaRef ds:uri="http://schemas.openxmlformats.org/package/2006/metadata/core-properties"/>
+    <ds:schemaRef ds:uri="http://purl.org/dc/elements/1.1/"/>
+    <ds:schemaRef ds:uri="http://purl.org/dc/terms/"/>
+    <ds:schemaRef ds:uri="http://schemas.microsoft.com/internal/obd"/>
+  </ds:schemaRefs>
+</ds:datastoreItem>
 </file>
</xml_diff>

<commit_message>
db update + diagrama de solução
</commit_message>
<xml_diff>
--- a/DIAGRAMS/diagramaSolucao.pptx
+++ b/DIAGRAMS/diagramaSolucao.pptx
@@ -259,7 +259,7 @@
           <a:p>
             <a:fld id="{4FA529B5-CAA8-4198-AEC0-DDF24B9B502D}" type="datetimeFigureOut">
               <a:rPr lang="en-US" smtClean="0"/>
-              <a:t>10/13/2022</a:t>
+              <a:t>10/24/2022</a:t>
             </a:fld>
             <a:endParaRPr lang="en-US"/>
           </a:p>
@@ -457,7 +457,7 @@
           <a:p>
             <a:fld id="{4FA529B5-CAA8-4198-AEC0-DDF24B9B502D}" type="datetimeFigureOut">
               <a:rPr lang="en-US" smtClean="0"/>
-              <a:t>10/13/2022</a:t>
+              <a:t>10/24/2022</a:t>
             </a:fld>
             <a:endParaRPr lang="en-US"/>
           </a:p>
@@ -665,7 +665,7 @@
           <a:p>
             <a:fld id="{4FA529B5-CAA8-4198-AEC0-DDF24B9B502D}" type="datetimeFigureOut">
               <a:rPr lang="en-US" smtClean="0"/>
-              <a:t>10/13/2022</a:t>
+              <a:t>10/24/2022</a:t>
             </a:fld>
             <a:endParaRPr lang="en-US"/>
           </a:p>
@@ -863,7 +863,7 @@
           <a:p>
             <a:fld id="{4FA529B5-CAA8-4198-AEC0-DDF24B9B502D}" type="datetimeFigureOut">
               <a:rPr lang="en-US" smtClean="0"/>
-              <a:t>10/13/2022</a:t>
+              <a:t>10/24/2022</a:t>
             </a:fld>
             <a:endParaRPr lang="en-US"/>
           </a:p>
@@ -1138,7 +1138,7 @@
           <a:p>
             <a:fld id="{4FA529B5-CAA8-4198-AEC0-DDF24B9B502D}" type="datetimeFigureOut">
               <a:rPr lang="en-US" smtClean="0"/>
-              <a:t>10/13/2022</a:t>
+              <a:t>10/24/2022</a:t>
             </a:fld>
             <a:endParaRPr lang="en-US"/>
           </a:p>
@@ -1403,7 +1403,7 @@
           <a:p>
             <a:fld id="{4FA529B5-CAA8-4198-AEC0-DDF24B9B502D}" type="datetimeFigureOut">
               <a:rPr lang="en-US" smtClean="0"/>
-              <a:t>10/13/2022</a:t>
+              <a:t>10/24/2022</a:t>
             </a:fld>
             <a:endParaRPr lang="en-US"/>
           </a:p>
@@ -1815,7 +1815,7 @@
           <a:p>
             <a:fld id="{4FA529B5-CAA8-4198-AEC0-DDF24B9B502D}" type="datetimeFigureOut">
               <a:rPr lang="en-US" smtClean="0"/>
-              <a:t>10/13/2022</a:t>
+              <a:t>10/24/2022</a:t>
             </a:fld>
             <a:endParaRPr lang="en-US"/>
           </a:p>
@@ -1956,7 +1956,7 @@
           <a:p>
             <a:fld id="{4FA529B5-CAA8-4198-AEC0-DDF24B9B502D}" type="datetimeFigureOut">
               <a:rPr lang="en-US" smtClean="0"/>
-              <a:t>10/13/2022</a:t>
+              <a:t>10/24/2022</a:t>
             </a:fld>
             <a:endParaRPr lang="en-US"/>
           </a:p>
@@ -2069,7 +2069,7 @@
           <a:p>
             <a:fld id="{4FA529B5-CAA8-4198-AEC0-DDF24B9B502D}" type="datetimeFigureOut">
               <a:rPr lang="en-US" smtClean="0"/>
-              <a:t>10/13/2022</a:t>
+              <a:t>10/24/2022</a:t>
             </a:fld>
             <a:endParaRPr lang="en-US"/>
           </a:p>
@@ -2380,7 +2380,7 @@
           <a:p>
             <a:fld id="{4FA529B5-CAA8-4198-AEC0-DDF24B9B502D}" type="datetimeFigureOut">
               <a:rPr lang="en-US" smtClean="0"/>
-              <a:t>10/13/2022</a:t>
+              <a:t>10/24/2022</a:t>
             </a:fld>
             <a:endParaRPr lang="en-US"/>
           </a:p>
@@ -2668,7 +2668,7 @@
           <a:p>
             <a:fld id="{4FA529B5-CAA8-4198-AEC0-DDF24B9B502D}" type="datetimeFigureOut">
               <a:rPr lang="en-US" smtClean="0"/>
-              <a:t>10/13/2022</a:t>
+              <a:t>10/24/2022</a:t>
             </a:fld>
             <a:endParaRPr lang="en-US"/>
           </a:p>
@@ -2909,7 +2909,7 @@
           <a:p>
             <a:fld id="{4FA529B5-CAA8-4198-AEC0-DDF24B9B502D}" type="datetimeFigureOut">
               <a:rPr lang="en-US" smtClean="0"/>
-              <a:t>10/13/2022</a:t>
+              <a:t>10/24/2022</a:t>
             </a:fld>
             <a:endParaRPr lang="en-US"/>
           </a:p>
@@ -3485,721 +3485,35 @@
           </a:p>
         </p:txBody>
       </p:sp>
-      <p:pic>
-        <p:nvPicPr>
-          <p:cNvPr id="1026" name="Picture 2">
-            <a:extLst>
-              <a:ext uri="{FF2B5EF4-FFF2-40B4-BE49-F238E27FC236}">
-                <a16:creationId xmlns:a16="http://schemas.microsoft.com/office/drawing/2014/main" id="{A8CAEE36-E69B-7149-98E6-A65F12F9828E}"/>
-              </a:ext>
-            </a:extLst>
-          </p:cNvPr>
-          <p:cNvPicPr>
-            <a:picLocks noChangeAspect="1" noChangeArrowheads="1"/>
-          </p:cNvPicPr>
+      <p:sp>
+        <p:nvSpPr>
+          <p:cNvPr id="1035" name="Rectangle 1034">
+            <a:extLst>
+              <a:ext uri="{FF2B5EF4-FFF2-40B4-BE49-F238E27FC236}">
+                <a16:creationId xmlns:a16="http://schemas.microsoft.com/office/drawing/2014/main" id="{9ADA0647-40F8-EE2A-38A2-135965DD955F}"/>
+              </a:ext>
+            </a:extLst>
+          </p:cNvPr>
+          <p:cNvSpPr/>
           <p:nvPr/>
-        </p:nvPicPr>
-        <p:blipFill>
-          <a:blip r:embed="rId2">
-            <a:extLst>
-              <a:ext uri="{28A0092B-C50C-407E-A947-70E740481C1C}">
-                <a14:useLocalDpi xmlns:a14="http://schemas.microsoft.com/office/drawing/2010/main" val="0"/>
-              </a:ext>
-            </a:extLst>
-          </a:blip>
-          <a:srcRect/>
-          <a:stretch>
-            <a:fillRect/>
-          </a:stretch>
-        </p:blipFill>
-        <p:spPr bwMode="auto">
+        </p:nvSpPr>
+        <p:spPr>
           <a:xfrm>
-            <a:off x="5722212" y="1881471"/>
-            <a:ext cx="747569" cy="868640"/>
+            <a:off x="6745076" y="525424"/>
+            <a:ext cx="1330308" cy="1104372"/>
           </a:xfrm>
           <a:prstGeom prst="rect">
             <a:avLst/>
           </a:prstGeom>
-          <a:noFill/>
-          <a:extLst>
-            <a:ext uri="{909E8E84-426E-40DD-AFC4-6F175D3DCCD1}">
-              <a14:hiddenFill xmlns:a14="http://schemas.microsoft.com/office/drawing/2010/main">
-                <a:solidFill>
-                  <a:srgbClr val="FFFFFF"/>
-                </a:solidFill>
-              </a14:hiddenFill>
-            </a:ext>
-          </a:extLst>
-        </p:spPr>
-      </p:pic>
-      <p:pic>
-        <p:nvPicPr>
-          <p:cNvPr id="1028" name="Picture 4">
-            <a:extLst>
-              <a:ext uri="{FF2B5EF4-FFF2-40B4-BE49-F238E27FC236}">
-                <a16:creationId xmlns:a16="http://schemas.microsoft.com/office/drawing/2014/main" id="{C6F6709D-B172-4D1C-4796-F6C20259BEAA}"/>
-              </a:ext>
-            </a:extLst>
-          </p:cNvPr>
-          <p:cNvPicPr>
-            <a:picLocks noChangeAspect="1" noChangeArrowheads="1"/>
-          </p:cNvPicPr>
-          <p:nvPr/>
-        </p:nvPicPr>
-        <p:blipFill>
-          <a:blip r:embed="rId3">
-            <a:extLst>
-              <a:ext uri="{28A0092B-C50C-407E-A947-70E740481C1C}">
-                <a14:useLocalDpi xmlns:a14="http://schemas.microsoft.com/office/drawing/2010/main" val="0"/>
-              </a:ext>
-            </a:extLst>
-          </a:blip>
-          <a:srcRect/>
-          <a:stretch>
-            <a:fillRect/>
-          </a:stretch>
-        </p:blipFill>
-        <p:spPr bwMode="auto">
-          <a:xfrm>
-            <a:off x="4988064" y="869476"/>
-            <a:ext cx="420255" cy="420255"/>
-          </a:xfrm>
-          <a:prstGeom prst="rect">
-            <a:avLst/>
-          </a:prstGeom>
-          <a:noFill/>
-          <a:extLst>
-            <a:ext uri="{909E8E84-426E-40DD-AFC4-6F175D3DCCD1}">
-              <a14:hiddenFill xmlns:a14="http://schemas.microsoft.com/office/drawing/2010/main">
-                <a:solidFill>
-                  <a:srgbClr val="FFFFFF"/>
-                </a:solidFill>
-              </a14:hiddenFill>
-            </a:ext>
-          </a:extLst>
-        </p:spPr>
-      </p:pic>
-      <p:pic>
-        <p:nvPicPr>
-          <p:cNvPr id="1030" name="Picture 6">
-            <a:extLst>
-              <a:ext uri="{FF2B5EF4-FFF2-40B4-BE49-F238E27FC236}">
-                <a16:creationId xmlns:a16="http://schemas.microsoft.com/office/drawing/2014/main" id="{5FAF6A49-B58C-D432-BEAA-2BE277C56F8D}"/>
-              </a:ext>
-            </a:extLst>
-          </p:cNvPr>
-          <p:cNvPicPr>
-            <a:picLocks noChangeAspect="1" noChangeArrowheads="1"/>
-          </p:cNvPicPr>
-          <p:nvPr/>
-        </p:nvPicPr>
-        <p:blipFill>
-          <a:blip r:embed="rId4">
-            <a:extLst>
-              <a:ext uri="{28A0092B-C50C-407E-A947-70E740481C1C}">
-                <a14:useLocalDpi xmlns:a14="http://schemas.microsoft.com/office/drawing/2010/main" val="0"/>
-              </a:ext>
-            </a:extLst>
-          </a:blip>
-          <a:srcRect/>
-          <a:stretch>
-            <a:fillRect/>
-          </a:stretch>
-        </p:blipFill>
-        <p:spPr bwMode="auto">
-          <a:xfrm>
-            <a:off x="4759626" y="1291470"/>
-            <a:ext cx="420255" cy="420255"/>
-          </a:xfrm>
-          <a:prstGeom prst="rect">
-            <a:avLst/>
-          </a:prstGeom>
-          <a:noFill/>
-          <a:extLst>
-            <a:ext uri="{909E8E84-426E-40DD-AFC4-6F175D3DCCD1}">
-              <a14:hiddenFill xmlns:a14="http://schemas.microsoft.com/office/drawing/2010/main">
-                <a:solidFill>
-                  <a:srgbClr val="FFFFFF"/>
-                </a:solidFill>
-              </a14:hiddenFill>
-            </a:ext>
-          </a:extLst>
-        </p:spPr>
-      </p:pic>
-      <p:pic>
-        <p:nvPicPr>
-          <p:cNvPr id="1032" name="Picture 8">
-            <a:extLst>
-              <a:ext uri="{FF2B5EF4-FFF2-40B4-BE49-F238E27FC236}">
-                <a16:creationId xmlns:a16="http://schemas.microsoft.com/office/drawing/2014/main" id="{72945E5D-CFA4-0405-3266-6B2D482BD38F}"/>
-              </a:ext>
-            </a:extLst>
-          </p:cNvPr>
-          <p:cNvPicPr>
-            <a:picLocks noChangeAspect="1" noChangeArrowheads="1"/>
-          </p:cNvPicPr>
-          <p:nvPr/>
-        </p:nvPicPr>
-        <p:blipFill>
-          <a:blip r:embed="rId5">
-            <a:extLst>
-              <a:ext uri="{28A0092B-C50C-407E-A947-70E740481C1C}">
-                <a14:useLocalDpi xmlns:a14="http://schemas.microsoft.com/office/drawing/2010/main" val="0"/>
-              </a:ext>
-            </a:extLst>
-          </a:blip>
-          <a:srcRect/>
-          <a:stretch>
-            <a:fillRect/>
-          </a:stretch>
-        </p:blipFill>
-        <p:spPr bwMode="auto">
-          <a:xfrm>
-            <a:off x="5150760" y="1293293"/>
-            <a:ext cx="420255" cy="420255"/>
-          </a:xfrm>
-          <a:prstGeom prst="rect">
-            <a:avLst/>
-          </a:prstGeom>
-          <a:noFill/>
-          <a:extLst>
-            <a:ext uri="{909E8E84-426E-40DD-AFC4-6F175D3DCCD1}">
-              <a14:hiddenFill xmlns:a14="http://schemas.microsoft.com/office/drawing/2010/main">
-                <a:solidFill>
-                  <a:srgbClr val="FFFFFF"/>
-                </a:solidFill>
-              </a14:hiddenFill>
-            </a:ext>
-          </a:extLst>
-        </p:spPr>
-      </p:pic>
-      <p:pic>
-        <p:nvPicPr>
-          <p:cNvPr id="1034" name="Picture 10">
-            <a:extLst>
-              <a:ext uri="{FF2B5EF4-FFF2-40B4-BE49-F238E27FC236}">
-                <a16:creationId xmlns:a16="http://schemas.microsoft.com/office/drawing/2014/main" id="{FC04A1E9-A163-2F45-EF40-1BAF44B211C3}"/>
-              </a:ext>
-            </a:extLst>
-          </p:cNvPr>
-          <p:cNvPicPr>
-            <a:picLocks noChangeAspect="1" noChangeArrowheads="1"/>
-          </p:cNvPicPr>
-          <p:nvPr/>
-        </p:nvPicPr>
-        <p:blipFill>
-          <a:blip r:embed="rId6">
-            <a:extLst>
-              <a:ext uri="{28A0092B-C50C-407E-A947-70E740481C1C}">
-                <a14:useLocalDpi xmlns:a14="http://schemas.microsoft.com/office/drawing/2010/main" val="0"/>
-              </a:ext>
-            </a:extLst>
-          </a:blip>
-          <a:srcRect/>
-          <a:stretch>
-            <a:fillRect/>
-          </a:stretch>
-        </p:blipFill>
-        <p:spPr bwMode="auto">
-          <a:xfrm>
-            <a:off x="5938402" y="921754"/>
-            <a:ext cx="315191" cy="315191"/>
-          </a:xfrm>
-          <a:prstGeom prst="rect">
-            <a:avLst/>
-          </a:prstGeom>
-          <a:noFill/>
-          <a:extLst>
-            <a:ext uri="{909E8E84-426E-40DD-AFC4-6F175D3DCCD1}">
-              <a14:hiddenFill xmlns:a14="http://schemas.microsoft.com/office/drawing/2010/main">
-                <a:solidFill>
-                  <a:srgbClr val="FFFFFF"/>
-                </a:solidFill>
-              </a14:hiddenFill>
-            </a:ext>
-          </a:extLst>
-        </p:spPr>
-      </p:pic>
-      <p:pic>
-        <p:nvPicPr>
-          <p:cNvPr id="1036" name="Picture 12">
-            <a:extLst>
-              <a:ext uri="{FF2B5EF4-FFF2-40B4-BE49-F238E27FC236}">
-                <a16:creationId xmlns:a16="http://schemas.microsoft.com/office/drawing/2014/main" id="{335FA1CF-008F-E513-89E2-8C3F334EF5B4}"/>
-              </a:ext>
-            </a:extLst>
-          </p:cNvPr>
-          <p:cNvPicPr>
-            <a:picLocks noChangeAspect="1" noChangeArrowheads="1"/>
-          </p:cNvPicPr>
-          <p:nvPr/>
-        </p:nvPicPr>
-        <p:blipFill>
-          <a:blip r:embed="rId7">
-            <a:extLst>
-              <a:ext uri="{28A0092B-C50C-407E-A947-70E740481C1C}">
-                <a14:useLocalDpi xmlns:a14="http://schemas.microsoft.com/office/drawing/2010/main" val="0"/>
-              </a:ext>
-            </a:extLst>
-          </a:blip>
-          <a:srcRect/>
-          <a:stretch>
-            <a:fillRect/>
-          </a:stretch>
-        </p:blipFill>
-        <p:spPr bwMode="auto">
-          <a:xfrm>
-            <a:off x="6683881" y="864247"/>
-            <a:ext cx="420255" cy="420255"/>
-          </a:xfrm>
-          <a:prstGeom prst="rect">
-            <a:avLst/>
-          </a:prstGeom>
-          <a:noFill/>
-          <a:extLst>
-            <a:ext uri="{909E8E84-426E-40DD-AFC4-6F175D3DCCD1}">
-              <a14:hiddenFill xmlns:a14="http://schemas.microsoft.com/office/drawing/2010/main">
-                <a:solidFill>
-                  <a:srgbClr val="FFFFFF"/>
-                </a:solidFill>
-              </a14:hiddenFill>
-            </a:ext>
-          </a:extLst>
-        </p:spPr>
-      </p:pic>
-      <p:pic>
-        <p:nvPicPr>
-          <p:cNvPr id="9" name="Picture 8">
-            <a:extLst>
-              <a:ext uri="{FF2B5EF4-FFF2-40B4-BE49-F238E27FC236}">
-                <a16:creationId xmlns:a16="http://schemas.microsoft.com/office/drawing/2014/main" id="{80480085-F5A4-10BF-865E-1E2CB9125098}"/>
-              </a:ext>
-            </a:extLst>
-          </p:cNvPr>
-          <p:cNvPicPr>
-            <a:picLocks noChangeAspect="1"/>
-          </p:cNvPicPr>
-          <p:nvPr/>
-        </p:nvPicPr>
-        <p:blipFill>
-          <a:blip r:embed="rId8">
-            <a:duotone>
-              <a:prstClr val="black"/>
-              <a:schemeClr val="accent5">
-                <a:tint val="45000"/>
-                <a:satMod val="400000"/>
-              </a:schemeClr>
-            </a:duotone>
-            <a:extLst>
-              <a:ext uri="{BEBA8EAE-BF5A-486C-A8C5-ECC9F3942E4B}">
-                <a14:imgProps xmlns:a14="http://schemas.microsoft.com/office/drawing/2010/main">
-                  <a14:imgLayer r:embed="rId9">
-                    <a14:imgEffect>
-                      <a14:backgroundRemoval t="9244" b="89916" l="6061" r="94444">
-                        <a14:foregroundMark x1="36364" y1="36134" x2="32071" y2="35294"/>
-                        <a14:foregroundMark x1="25000" y1="34454" x2="19949" y2="36975"/>
-                        <a14:foregroundMark x1="6061" y1="34454" x2="6061" y2="40336"/>
-                        <a14:foregroundMark x1="41414" y1="48739" x2="41414" y2="48739"/>
-                        <a14:foregroundMark x1="41414" y1="48739" x2="41414" y2="48739"/>
-                        <a14:foregroundMark x1="49495" y1="47059" x2="49495" y2="47059"/>
-                        <a14:foregroundMark x1="89899" y1="26050" x2="89899" y2="26050"/>
-                        <a14:foregroundMark x1="94444" y1="30252" x2="94444" y2="30252"/>
-                        <a14:foregroundMark x1="75253" y1="31092" x2="75253" y2="31092"/>
-                      </a14:backgroundRemoval>
-                    </a14:imgEffect>
-                  </a14:imgLayer>
-                </a14:imgProps>
-              </a:ext>
-            </a:extLst>
-          </a:blip>
-          <a:stretch>
-            <a:fillRect/>
-          </a:stretch>
-        </p:blipFill>
-        <p:spPr>
-          <a:xfrm>
-            <a:off x="414767" y="5036130"/>
-            <a:ext cx="2639750" cy="793258"/>
-          </a:xfrm>
-          <a:prstGeom prst="rect">
-            <a:avLst/>
-          </a:prstGeom>
-        </p:spPr>
-      </p:pic>
-      <p:pic>
-        <p:nvPicPr>
-          <p:cNvPr id="1038" name="Picture 14">
-            <a:extLst>
-              <a:ext uri="{FF2B5EF4-FFF2-40B4-BE49-F238E27FC236}">
-                <a16:creationId xmlns:a16="http://schemas.microsoft.com/office/drawing/2014/main" id="{E25A31BC-EF8E-33B8-51E0-CE033AB87D1A}"/>
-              </a:ext>
-            </a:extLst>
-          </p:cNvPr>
-          <p:cNvPicPr>
-            <a:picLocks noChangeAspect="1" noChangeArrowheads="1"/>
-          </p:cNvPicPr>
-          <p:nvPr/>
-        </p:nvPicPr>
-        <p:blipFill>
-          <a:blip r:embed="rId10">
-            <a:extLst>
-              <a:ext uri="{28A0092B-C50C-407E-A947-70E740481C1C}">
-                <a14:useLocalDpi xmlns:a14="http://schemas.microsoft.com/office/drawing/2010/main" val="0"/>
-              </a:ext>
-            </a:extLst>
-          </a:blip>
-          <a:srcRect/>
-          <a:stretch>
-            <a:fillRect/>
-          </a:stretch>
-        </p:blipFill>
-        <p:spPr bwMode="auto">
-          <a:xfrm>
-            <a:off x="2321369" y="3364401"/>
-            <a:ext cx="1390019" cy="1390019"/>
-          </a:xfrm>
-          <a:prstGeom prst="rect">
-            <a:avLst/>
-          </a:prstGeom>
-          <a:noFill/>
-          <a:extLst>
-            <a:ext uri="{909E8E84-426E-40DD-AFC4-6F175D3DCCD1}">
-              <a14:hiddenFill xmlns:a14="http://schemas.microsoft.com/office/drawing/2010/main">
-                <a:solidFill>
-                  <a:srgbClr val="FFFFFF"/>
-                </a:solidFill>
-              </a14:hiddenFill>
-            </a:ext>
-          </a:extLst>
-        </p:spPr>
-      </p:pic>
-      <p:pic>
-        <p:nvPicPr>
-          <p:cNvPr id="1040" name="Picture 16">
-            <a:extLst>
-              <a:ext uri="{FF2B5EF4-FFF2-40B4-BE49-F238E27FC236}">
-                <a16:creationId xmlns:a16="http://schemas.microsoft.com/office/drawing/2014/main" id="{5E7B00DC-4DB6-2CB6-7747-F10BEF11F149}"/>
-              </a:ext>
-            </a:extLst>
-          </p:cNvPr>
-          <p:cNvPicPr>
-            <a:picLocks noChangeAspect="1" noChangeArrowheads="1"/>
-          </p:cNvPicPr>
-          <p:nvPr/>
-        </p:nvPicPr>
-        <p:blipFill>
-          <a:blip r:embed="rId11">
-            <a:extLst>
-              <a:ext uri="{28A0092B-C50C-407E-A947-70E740481C1C}">
-                <a14:useLocalDpi xmlns:a14="http://schemas.microsoft.com/office/drawing/2010/main" val="0"/>
-              </a:ext>
-            </a:extLst>
-          </a:blip>
-          <a:srcRect/>
-          <a:stretch>
-            <a:fillRect/>
-          </a:stretch>
-        </p:blipFill>
-        <p:spPr bwMode="auto">
-          <a:xfrm>
-            <a:off x="154587" y="5809776"/>
-            <a:ext cx="816063" cy="816063"/>
-          </a:xfrm>
-          <a:prstGeom prst="rect">
-            <a:avLst/>
-          </a:prstGeom>
-          <a:noFill/>
-          <a:extLst>
-            <a:ext uri="{909E8E84-426E-40DD-AFC4-6F175D3DCCD1}">
-              <a14:hiddenFill xmlns:a14="http://schemas.microsoft.com/office/drawing/2010/main">
-                <a:solidFill>
-                  <a:srgbClr val="FFFFFF"/>
-                </a:solidFill>
-              </a14:hiddenFill>
-            </a:ext>
-          </a:extLst>
-        </p:spPr>
-      </p:pic>
-      <p:cxnSp>
-        <p:nvCxnSpPr>
-          <p:cNvPr id="12" name="Connector: Elbow 11">
-            <a:extLst>
-              <a:ext uri="{FF2B5EF4-FFF2-40B4-BE49-F238E27FC236}">
-                <a16:creationId xmlns:a16="http://schemas.microsoft.com/office/drawing/2014/main" id="{8A054140-D3F9-6CC7-C1C6-56EC59B155A9}"/>
-              </a:ext>
-            </a:extLst>
-          </p:cNvPr>
-          <p:cNvCxnSpPr>
-            <a:cxnSpLocks/>
-            <a:stCxn id="1034" idx="2"/>
-            <a:endCxn id="1026" idx="0"/>
-          </p:cNvCxnSpPr>
-          <p:nvPr/>
-        </p:nvCxnSpPr>
-        <p:spPr>
-          <a:xfrm rot="5400000">
-            <a:off x="5773735" y="1559208"/>
-            <a:ext cx="644526" cy="1"/>
-          </a:xfrm>
-          <a:prstGeom prst="bentConnector3">
-            <a:avLst/>
-          </a:prstGeom>
-          <a:ln w="19050">
-            <a:prstDash val="sysDash"/>
-          </a:ln>
-        </p:spPr>
-        <p:style>
-          <a:lnRef idx="1">
-            <a:schemeClr val="accent6"/>
-          </a:lnRef>
-          <a:fillRef idx="0">
-            <a:schemeClr val="accent6"/>
-          </a:fillRef>
-          <a:effectRef idx="0">
-            <a:schemeClr val="accent6"/>
-          </a:effectRef>
-          <a:fontRef idx="minor">
-            <a:schemeClr val="tx1"/>
-          </a:fontRef>
-        </p:style>
-      </p:cxnSp>
-      <p:cxnSp>
-        <p:nvCxnSpPr>
-          <p:cNvPr id="18" name="Connector: Elbow 17">
-            <a:extLst>
-              <a:ext uri="{FF2B5EF4-FFF2-40B4-BE49-F238E27FC236}">
-                <a16:creationId xmlns:a16="http://schemas.microsoft.com/office/drawing/2014/main" id="{DF956C61-5AAF-2A19-841E-88349094C78B}"/>
-              </a:ext>
-            </a:extLst>
-          </p:cNvPr>
-          <p:cNvCxnSpPr>
-            <a:cxnSpLocks/>
-            <a:stCxn id="1034" idx="1"/>
-            <a:endCxn id="1028" idx="3"/>
-          </p:cNvCxnSpPr>
-          <p:nvPr/>
-        </p:nvCxnSpPr>
-        <p:spPr>
-          <a:xfrm rot="10800000" flipV="1">
-            <a:off x="5408320" y="1079350"/>
-            <a:ext cx="530083" cy="254"/>
-          </a:xfrm>
-          <a:prstGeom prst="bentConnector3">
-            <a:avLst/>
-          </a:prstGeom>
-          <a:ln w="19050">
-            <a:prstDash val="sysDash"/>
-          </a:ln>
-        </p:spPr>
-        <p:style>
-          <a:lnRef idx="1">
-            <a:schemeClr val="accent6"/>
-          </a:lnRef>
-          <a:fillRef idx="0">
-            <a:schemeClr val="accent6"/>
-          </a:fillRef>
-          <a:effectRef idx="0">
-            <a:schemeClr val="accent6"/>
-          </a:effectRef>
-          <a:fontRef idx="minor">
-            <a:schemeClr val="tx1"/>
-          </a:fontRef>
-        </p:style>
-      </p:cxnSp>
-      <p:cxnSp>
-        <p:nvCxnSpPr>
-          <p:cNvPr id="20" name="Connector: Elbow 19">
-            <a:extLst>
-              <a:ext uri="{FF2B5EF4-FFF2-40B4-BE49-F238E27FC236}">
-                <a16:creationId xmlns:a16="http://schemas.microsoft.com/office/drawing/2014/main" id="{EF85AAE7-C252-4CC2-4811-77414CA4A94B}"/>
-              </a:ext>
-            </a:extLst>
-          </p:cNvPr>
-          <p:cNvCxnSpPr>
-            <a:cxnSpLocks/>
-            <a:stCxn id="1034" idx="3"/>
-            <a:endCxn id="1036" idx="1"/>
-          </p:cNvCxnSpPr>
-          <p:nvPr/>
-        </p:nvCxnSpPr>
-        <p:spPr>
-          <a:xfrm flipV="1">
-            <a:off x="6253593" y="1074375"/>
-            <a:ext cx="430288" cy="4975"/>
-          </a:xfrm>
-          <a:prstGeom prst="bentConnector3">
-            <a:avLst>
-              <a:gd name="adj1" fmla="val 50000"/>
-            </a:avLst>
-          </a:prstGeom>
-          <a:ln w="19050">
-            <a:prstDash val="sysDash"/>
-          </a:ln>
-        </p:spPr>
-        <p:style>
-          <a:lnRef idx="1">
-            <a:schemeClr val="accent6"/>
-          </a:lnRef>
-          <a:fillRef idx="0">
-            <a:schemeClr val="accent6"/>
-          </a:fillRef>
-          <a:effectRef idx="0">
-            <a:schemeClr val="accent6"/>
-          </a:effectRef>
-          <a:fontRef idx="minor">
-            <a:schemeClr val="tx1"/>
-          </a:fontRef>
-        </p:style>
-      </p:cxnSp>
-      <p:pic>
-        <p:nvPicPr>
-          <p:cNvPr id="1042" name="Picture 18">
-            <a:extLst>
-              <a:ext uri="{FF2B5EF4-FFF2-40B4-BE49-F238E27FC236}">
-                <a16:creationId xmlns:a16="http://schemas.microsoft.com/office/drawing/2014/main" id="{19280BF3-2DA3-2FB0-F13E-70BCFB16E79D}"/>
-              </a:ext>
-            </a:extLst>
-          </p:cNvPr>
-          <p:cNvPicPr>
-            <a:picLocks noChangeAspect="1" noChangeArrowheads="1"/>
-          </p:cNvPicPr>
-          <p:nvPr/>
-        </p:nvPicPr>
-        <p:blipFill>
-          <a:blip r:embed="rId12">
-            <a:duotone>
-              <a:schemeClr val="accent5">
-                <a:shade val="45000"/>
-                <a:satMod val="135000"/>
-              </a:schemeClr>
-              <a:prstClr val="white"/>
-            </a:duotone>
-            <a:extLst>
-              <a:ext uri="{28A0092B-C50C-407E-A947-70E740481C1C}">
-                <a14:useLocalDpi xmlns:a14="http://schemas.microsoft.com/office/drawing/2010/main" val="0"/>
-              </a:ext>
-            </a:extLst>
-          </a:blip>
-          <a:srcRect/>
-          <a:stretch>
-            <a:fillRect/>
-          </a:stretch>
-        </p:blipFill>
-        <p:spPr bwMode="auto">
-          <a:xfrm>
-            <a:off x="839307" y="4166887"/>
-            <a:ext cx="719362" cy="719362"/>
-          </a:xfrm>
-          <a:prstGeom prst="rect">
-            <a:avLst/>
-          </a:prstGeom>
-          <a:noFill/>
-          <a:extLst>
-            <a:ext uri="{909E8E84-426E-40DD-AFC4-6F175D3DCCD1}">
-              <a14:hiddenFill xmlns:a14="http://schemas.microsoft.com/office/drawing/2010/main">
-                <a:solidFill>
-                  <a:srgbClr val="FFFFFF"/>
-                </a:solidFill>
-              </a14:hiddenFill>
-            </a:ext>
-          </a:extLst>
-        </p:spPr>
-      </p:pic>
-      <p:pic>
-        <p:nvPicPr>
-          <p:cNvPr id="1044" name="Picture 20">
-            <a:extLst>
-              <a:ext uri="{FF2B5EF4-FFF2-40B4-BE49-F238E27FC236}">
-                <a16:creationId xmlns:a16="http://schemas.microsoft.com/office/drawing/2014/main" id="{CCC8C69A-C34C-837F-F6D1-3E8ADE365EC0}"/>
-              </a:ext>
-            </a:extLst>
-          </p:cNvPr>
-          <p:cNvPicPr>
-            <a:picLocks noChangeAspect="1" noChangeArrowheads="1"/>
-          </p:cNvPicPr>
-          <p:nvPr/>
-        </p:nvPicPr>
-        <p:blipFill>
-          <a:blip r:embed="rId13">
-            <a:duotone>
-              <a:schemeClr val="accent5">
-                <a:shade val="45000"/>
-                <a:satMod val="135000"/>
-              </a:schemeClr>
-              <a:prstClr val="white"/>
-            </a:duotone>
-            <a:extLst>
-              <a:ext uri="{BEBA8EAE-BF5A-486C-A8C5-ECC9F3942E4B}">
-                <a14:imgProps xmlns:a14="http://schemas.microsoft.com/office/drawing/2010/main">
-                  <a14:imgLayer r:embed="rId14">
-                    <a14:imgEffect>
-                      <a14:colorTemperature colorTemp="1500"/>
-                    </a14:imgEffect>
-                    <a14:imgEffect>
-                      <a14:saturation sat="101000"/>
-                    </a14:imgEffect>
-                  </a14:imgLayer>
-                </a14:imgProps>
-              </a:ext>
-              <a:ext uri="{28A0092B-C50C-407E-A947-70E740481C1C}">
-                <a14:useLocalDpi xmlns:a14="http://schemas.microsoft.com/office/drawing/2010/main" val="0"/>
-              </a:ext>
-            </a:extLst>
-          </a:blip>
-          <a:srcRect/>
-          <a:stretch>
-            <a:fillRect/>
-          </a:stretch>
-        </p:blipFill>
-        <p:spPr bwMode="auto">
-          <a:xfrm>
-            <a:off x="2342596" y="5595446"/>
-            <a:ext cx="681318" cy="681318"/>
-          </a:xfrm>
-          <a:prstGeom prst="rect">
-            <a:avLst/>
-          </a:prstGeom>
-          <a:noFill/>
-          <a:extLst>
-            <a:ext uri="{909E8E84-426E-40DD-AFC4-6F175D3DCCD1}">
-              <a14:hiddenFill xmlns:a14="http://schemas.microsoft.com/office/drawing/2010/main">
-                <a:solidFill>
-                  <a:srgbClr val="FFFFFF"/>
-                </a:solidFill>
-              </a14:hiddenFill>
-            </a:ext>
-          </a:extLst>
-        </p:spPr>
-      </p:pic>
-      <p:sp>
-        <p:nvSpPr>
-          <p:cNvPr id="28" name="Pentagon 27">
-            <a:extLst>
-              <a:ext uri="{FF2B5EF4-FFF2-40B4-BE49-F238E27FC236}">
-                <a16:creationId xmlns:a16="http://schemas.microsoft.com/office/drawing/2014/main" id="{8A2A196D-7AA6-5818-D3C7-C3A288B9E38B}"/>
-              </a:ext>
-            </a:extLst>
-          </p:cNvPr>
-          <p:cNvSpPr/>
-          <p:nvPr/>
-        </p:nvSpPr>
-        <p:spPr>
-          <a:xfrm>
-            <a:off x="8160099" y="3042278"/>
-            <a:ext cx="4477463" cy="3987705"/>
-          </a:xfrm>
-          <a:prstGeom prst="pentagon">
-            <a:avLst/>
-          </a:prstGeom>
           <a:solidFill>
-            <a:schemeClr val="accent2">
-              <a:lumMod val="60000"/>
-              <a:lumOff val="40000"/>
-              <a:alpha val="16078"/>
+            <a:schemeClr val="accent6">
+              <a:alpha val="20000"/>
             </a:schemeClr>
           </a:solidFill>
-          <a:ln>
-            <a:noFill/>
+          <a:ln w="19050">
+            <a:solidFill>
+              <a:schemeClr val="accent6"/>
+            </a:solidFill>
           </a:ln>
         </p:spPr>
         <p:style>
@@ -4229,10 +3543,10 @@
       </p:sp>
       <p:pic>
         <p:nvPicPr>
-          <p:cNvPr id="30" name="Picture 14">
-            <a:extLst>
-              <a:ext uri="{FF2B5EF4-FFF2-40B4-BE49-F238E27FC236}">
-                <a16:creationId xmlns:a16="http://schemas.microsoft.com/office/drawing/2014/main" id="{9D44D9B2-B85A-20AA-C60C-73801843EEAB}"/>
+          <p:cNvPr id="1026" name="Picture 2">
+            <a:extLst>
+              <a:ext uri="{FF2B5EF4-FFF2-40B4-BE49-F238E27FC236}">
+                <a16:creationId xmlns:a16="http://schemas.microsoft.com/office/drawing/2014/main" id="{A8CAEE36-E69B-7149-98E6-A65F12F9828E}"/>
               </a:ext>
             </a:extLst>
           </p:cNvPr>
@@ -4242,7 +3556,7 @@
           <p:nvPr/>
         </p:nvPicPr>
         <p:blipFill>
-          <a:blip r:embed="rId10">
+          <a:blip r:embed="rId2">
             <a:extLst>
               <a:ext uri="{28A0092B-C50C-407E-A947-70E740481C1C}">
                 <a14:useLocalDpi xmlns:a14="http://schemas.microsoft.com/office/drawing/2010/main" val="0"/>
@@ -4256,8 +3570,8 @@
         </p:blipFill>
         <p:spPr bwMode="auto">
           <a:xfrm>
-            <a:off x="8291520" y="3296540"/>
-            <a:ext cx="1390019" cy="1390019"/>
+            <a:off x="5722212" y="1881471"/>
+            <a:ext cx="747569" cy="868640"/>
           </a:xfrm>
           <a:prstGeom prst="rect">
             <a:avLst/>
@@ -4274,6 +3588,476 @@
           </a:extLst>
         </p:spPr>
       </p:pic>
+      <p:pic>
+        <p:nvPicPr>
+          <p:cNvPr id="1028" name="Picture 4">
+            <a:extLst>
+              <a:ext uri="{FF2B5EF4-FFF2-40B4-BE49-F238E27FC236}">
+                <a16:creationId xmlns:a16="http://schemas.microsoft.com/office/drawing/2014/main" id="{C6F6709D-B172-4D1C-4796-F6C20259BEAA}"/>
+              </a:ext>
+            </a:extLst>
+          </p:cNvPr>
+          <p:cNvPicPr>
+            <a:picLocks noChangeAspect="1" noChangeArrowheads="1"/>
+          </p:cNvPicPr>
+          <p:nvPr/>
+        </p:nvPicPr>
+        <p:blipFill>
+          <a:blip r:embed="rId3">
+            <a:extLst>
+              <a:ext uri="{28A0092B-C50C-407E-A947-70E740481C1C}">
+                <a14:useLocalDpi xmlns:a14="http://schemas.microsoft.com/office/drawing/2010/main" val="0"/>
+              </a:ext>
+            </a:extLst>
+          </a:blip>
+          <a:srcRect/>
+          <a:stretch>
+            <a:fillRect/>
+          </a:stretch>
+        </p:blipFill>
+        <p:spPr bwMode="auto">
+          <a:xfrm>
+            <a:off x="7193789" y="658092"/>
+            <a:ext cx="420255" cy="420255"/>
+          </a:xfrm>
+          <a:prstGeom prst="rect">
+            <a:avLst/>
+          </a:prstGeom>
+          <a:noFill/>
+          <a:extLst>
+            <a:ext uri="{909E8E84-426E-40DD-AFC4-6F175D3DCCD1}">
+              <a14:hiddenFill xmlns:a14="http://schemas.microsoft.com/office/drawing/2010/main">
+                <a:solidFill>
+                  <a:srgbClr val="FFFFFF"/>
+                </a:solidFill>
+              </a14:hiddenFill>
+            </a:ext>
+          </a:extLst>
+        </p:spPr>
+      </p:pic>
+      <p:pic>
+        <p:nvPicPr>
+          <p:cNvPr id="1030" name="Picture 6">
+            <a:extLst>
+              <a:ext uri="{FF2B5EF4-FFF2-40B4-BE49-F238E27FC236}">
+                <a16:creationId xmlns:a16="http://schemas.microsoft.com/office/drawing/2014/main" id="{5FAF6A49-B58C-D432-BEAA-2BE277C56F8D}"/>
+              </a:ext>
+            </a:extLst>
+          </p:cNvPr>
+          <p:cNvPicPr>
+            <a:picLocks noChangeAspect="1" noChangeArrowheads="1"/>
+          </p:cNvPicPr>
+          <p:nvPr/>
+        </p:nvPicPr>
+        <p:blipFill>
+          <a:blip r:embed="rId4">
+            <a:extLst>
+              <a:ext uri="{28A0092B-C50C-407E-A947-70E740481C1C}">
+                <a14:useLocalDpi xmlns:a14="http://schemas.microsoft.com/office/drawing/2010/main" val="0"/>
+              </a:ext>
+            </a:extLst>
+          </a:blip>
+          <a:srcRect/>
+          <a:stretch>
+            <a:fillRect/>
+          </a:stretch>
+        </p:blipFill>
+        <p:spPr bwMode="auto">
+          <a:xfrm>
+            <a:off x="7003356" y="1099040"/>
+            <a:ext cx="420255" cy="420255"/>
+          </a:xfrm>
+          <a:prstGeom prst="rect">
+            <a:avLst/>
+          </a:prstGeom>
+          <a:noFill/>
+          <a:extLst>
+            <a:ext uri="{909E8E84-426E-40DD-AFC4-6F175D3DCCD1}">
+              <a14:hiddenFill xmlns:a14="http://schemas.microsoft.com/office/drawing/2010/main">
+                <a:solidFill>
+                  <a:srgbClr val="FFFFFF"/>
+                </a:solidFill>
+              </a14:hiddenFill>
+            </a:ext>
+          </a:extLst>
+        </p:spPr>
+      </p:pic>
+      <p:pic>
+        <p:nvPicPr>
+          <p:cNvPr id="1032" name="Picture 8">
+            <a:extLst>
+              <a:ext uri="{FF2B5EF4-FFF2-40B4-BE49-F238E27FC236}">
+                <a16:creationId xmlns:a16="http://schemas.microsoft.com/office/drawing/2014/main" id="{72945E5D-CFA4-0405-3266-6B2D482BD38F}"/>
+              </a:ext>
+            </a:extLst>
+          </p:cNvPr>
+          <p:cNvPicPr>
+            <a:picLocks noChangeAspect="1" noChangeArrowheads="1"/>
+          </p:cNvPicPr>
+          <p:nvPr/>
+        </p:nvPicPr>
+        <p:blipFill>
+          <a:blip r:embed="rId5">
+            <a:extLst>
+              <a:ext uri="{28A0092B-C50C-407E-A947-70E740481C1C}">
+                <a14:useLocalDpi xmlns:a14="http://schemas.microsoft.com/office/drawing/2010/main" val="0"/>
+              </a:ext>
+            </a:extLst>
+          </a:blip>
+          <a:srcRect/>
+          <a:stretch>
+            <a:fillRect/>
+          </a:stretch>
+        </p:blipFill>
+        <p:spPr bwMode="auto">
+          <a:xfrm>
+            <a:off x="7394490" y="1092565"/>
+            <a:ext cx="420255" cy="420255"/>
+          </a:xfrm>
+          <a:prstGeom prst="rect">
+            <a:avLst/>
+          </a:prstGeom>
+          <a:noFill/>
+          <a:extLst>
+            <a:ext uri="{909E8E84-426E-40DD-AFC4-6F175D3DCCD1}">
+              <a14:hiddenFill xmlns:a14="http://schemas.microsoft.com/office/drawing/2010/main">
+                <a:solidFill>
+                  <a:srgbClr val="FFFFFF"/>
+                </a:solidFill>
+              </a14:hiddenFill>
+            </a:ext>
+          </a:extLst>
+        </p:spPr>
+      </p:pic>
+      <p:pic>
+        <p:nvPicPr>
+          <p:cNvPr id="1034" name="Picture 10">
+            <a:extLst>
+              <a:ext uri="{FF2B5EF4-FFF2-40B4-BE49-F238E27FC236}">
+                <a16:creationId xmlns:a16="http://schemas.microsoft.com/office/drawing/2014/main" id="{FC04A1E9-A163-2F45-EF40-1BAF44B211C3}"/>
+              </a:ext>
+            </a:extLst>
+          </p:cNvPr>
+          <p:cNvPicPr>
+            <a:picLocks noChangeAspect="1" noChangeArrowheads="1"/>
+          </p:cNvPicPr>
+          <p:nvPr/>
+        </p:nvPicPr>
+        <p:blipFill>
+          <a:blip r:embed="rId6">
+            <a:extLst>
+              <a:ext uri="{28A0092B-C50C-407E-A947-70E740481C1C}">
+                <a14:useLocalDpi xmlns:a14="http://schemas.microsoft.com/office/drawing/2010/main" val="0"/>
+              </a:ext>
+            </a:extLst>
+          </a:blip>
+          <a:srcRect/>
+          <a:stretch>
+            <a:fillRect/>
+          </a:stretch>
+        </p:blipFill>
+        <p:spPr bwMode="auto">
+          <a:xfrm>
+            <a:off x="6598377" y="918840"/>
+            <a:ext cx="315191" cy="315191"/>
+          </a:xfrm>
+          <a:prstGeom prst="rect">
+            <a:avLst/>
+          </a:prstGeom>
+          <a:noFill/>
+          <a:extLst>
+            <a:ext uri="{909E8E84-426E-40DD-AFC4-6F175D3DCCD1}">
+              <a14:hiddenFill xmlns:a14="http://schemas.microsoft.com/office/drawing/2010/main">
+                <a:solidFill>
+                  <a:srgbClr val="FFFFFF"/>
+                </a:solidFill>
+              </a14:hiddenFill>
+            </a:ext>
+          </a:extLst>
+        </p:spPr>
+      </p:pic>
+      <p:sp>
+        <p:nvSpPr>
+          <p:cNvPr id="59" name="Rectangle 58">
+            <a:extLst>
+              <a:ext uri="{FF2B5EF4-FFF2-40B4-BE49-F238E27FC236}">
+                <a16:creationId xmlns:a16="http://schemas.microsoft.com/office/drawing/2014/main" id="{E711CF1C-AB04-680C-519A-C4627E5F49E3}"/>
+              </a:ext>
+            </a:extLst>
+          </p:cNvPr>
+          <p:cNvSpPr/>
+          <p:nvPr/>
+        </p:nvSpPr>
+        <p:spPr>
+          <a:xfrm>
+            <a:off x="752244" y="4562717"/>
+            <a:ext cx="2222390" cy="1393177"/>
+          </a:xfrm>
+          <a:prstGeom prst="rect">
+            <a:avLst/>
+          </a:prstGeom>
+          <a:solidFill>
+            <a:srgbClr val="FF1616">
+              <a:alpha val="40000"/>
+            </a:srgbClr>
+          </a:solidFill>
+        </p:spPr>
+        <p:style>
+          <a:lnRef idx="2">
+            <a:schemeClr val="accent1">
+              <a:shade val="50000"/>
+            </a:schemeClr>
+          </a:lnRef>
+          <a:fillRef idx="1">
+            <a:schemeClr val="accent1"/>
+          </a:fillRef>
+          <a:effectRef idx="0">
+            <a:schemeClr val="accent1"/>
+          </a:effectRef>
+          <a:fontRef idx="minor">
+            <a:schemeClr val="lt1"/>
+          </a:fontRef>
+        </p:style>
+        <p:txBody>
+          <a:bodyPr rtlCol="0" anchor="ctr"/>
+          <a:lstStyle/>
+          <a:p>
+            <a:pPr algn="ctr"/>
+            <a:endParaRPr lang="en-US"/>
+          </a:p>
+        </p:txBody>
+      </p:sp>
+      <p:pic>
+        <p:nvPicPr>
+          <p:cNvPr id="38" name="Graphic 37" descr="Laptop with solid fill">
+            <a:extLst>
+              <a:ext uri="{FF2B5EF4-FFF2-40B4-BE49-F238E27FC236}">
+                <a16:creationId xmlns:a16="http://schemas.microsoft.com/office/drawing/2014/main" id="{AE7BBD21-FCA0-178E-9D47-6182F1C4E20D}"/>
+              </a:ext>
+            </a:extLst>
+          </p:cNvPr>
+          <p:cNvPicPr>
+            <a:picLocks noChangeAspect="1"/>
+          </p:cNvPicPr>
+          <p:nvPr/>
+        </p:nvPicPr>
+        <p:blipFill>
+          <a:blip r:embed="rId7">
+            <a:extLst>
+              <a:ext uri="{28A0092B-C50C-407E-A947-70E740481C1C}">
+                <a14:useLocalDpi xmlns:a14="http://schemas.microsoft.com/office/drawing/2010/main" val="0"/>
+              </a:ext>
+              <a:ext uri="{96DAC541-7B7A-43D3-8B79-37D633B846F1}">
+                <asvg:svgBlip xmlns:asvg="http://schemas.microsoft.com/office/drawing/2016/SVG/main" r:embed="rId8"/>
+              </a:ext>
+            </a:extLst>
+          </a:blip>
+          <a:stretch>
+            <a:fillRect/>
+          </a:stretch>
+        </p:blipFill>
+        <p:spPr>
+          <a:xfrm>
+            <a:off x="-2935" y="3576427"/>
+            <a:ext cx="3723495" cy="3723495"/>
+          </a:xfrm>
+          <a:prstGeom prst="rect">
+            <a:avLst/>
+          </a:prstGeom>
+        </p:spPr>
+      </p:pic>
+      <p:pic>
+        <p:nvPicPr>
+          <p:cNvPr id="1040" name="Picture 16">
+            <a:extLst>
+              <a:ext uri="{FF2B5EF4-FFF2-40B4-BE49-F238E27FC236}">
+                <a16:creationId xmlns:a16="http://schemas.microsoft.com/office/drawing/2014/main" id="{5E7B00DC-4DB6-2CB6-7747-F10BEF11F149}"/>
+              </a:ext>
+            </a:extLst>
+          </p:cNvPr>
+          <p:cNvPicPr>
+            <a:picLocks noChangeAspect="1" noChangeArrowheads="1"/>
+          </p:cNvPicPr>
+          <p:nvPr/>
+        </p:nvPicPr>
+        <p:blipFill>
+          <a:blip r:embed="rId9">
+            <a:extLst>
+              <a:ext uri="{28A0092B-C50C-407E-A947-70E740481C1C}">
+                <a14:useLocalDpi xmlns:a14="http://schemas.microsoft.com/office/drawing/2010/main" val="0"/>
+              </a:ext>
+            </a:extLst>
+          </a:blip>
+          <a:srcRect/>
+          <a:stretch>
+            <a:fillRect/>
+          </a:stretch>
+        </p:blipFill>
+        <p:spPr bwMode="auto">
+          <a:xfrm>
+            <a:off x="1543269" y="4986617"/>
+            <a:ext cx="557908" cy="557908"/>
+          </a:xfrm>
+          <a:prstGeom prst="rect">
+            <a:avLst/>
+          </a:prstGeom>
+          <a:noFill/>
+          <a:extLst>
+            <a:ext uri="{909E8E84-426E-40DD-AFC4-6F175D3DCCD1}">
+              <a14:hiddenFill xmlns:a14="http://schemas.microsoft.com/office/drawing/2010/main">
+                <a:solidFill>
+                  <a:srgbClr val="FFFFFF"/>
+                </a:solidFill>
+              </a14:hiddenFill>
+            </a:ext>
+          </a:extLst>
+        </p:spPr>
+      </p:pic>
+      <p:cxnSp>
+        <p:nvCxnSpPr>
+          <p:cNvPr id="12" name="Connector: Elbow 11">
+            <a:extLst>
+              <a:ext uri="{FF2B5EF4-FFF2-40B4-BE49-F238E27FC236}">
+                <a16:creationId xmlns:a16="http://schemas.microsoft.com/office/drawing/2014/main" id="{8A054140-D3F9-6CC7-C1C6-56EC59B155A9}"/>
+              </a:ext>
+            </a:extLst>
+          </p:cNvPr>
+          <p:cNvCxnSpPr>
+            <a:cxnSpLocks/>
+            <a:stCxn id="1034" idx="1"/>
+          </p:cNvCxnSpPr>
+          <p:nvPr/>
+        </p:nvCxnSpPr>
+        <p:spPr>
+          <a:xfrm rot="10800000" flipV="1">
+            <a:off x="6086571" y="1076435"/>
+            <a:ext cx="511806" cy="805035"/>
+          </a:xfrm>
+          <a:prstGeom prst="bentConnector2">
+            <a:avLst/>
+          </a:prstGeom>
+          <a:ln w="19050">
+            <a:prstDash val="sysDash"/>
+          </a:ln>
+        </p:spPr>
+        <p:style>
+          <a:lnRef idx="1">
+            <a:schemeClr val="accent6"/>
+          </a:lnRef>
+          <a:fillRef idx="0">
+            <a:schemeClr val="accent6"/>
+          </a:fillRef>
+          <a:effectRef idx="0">
+            <a:schemeClr val="accent6"/>
+          </a:effectRef>
+          <a:fontRef idx="minor">
+            <a:schemeClr val="tx1"/>
+          </a:fontRef>
+        </p:style>
+      </p:cxnSp>
+      <p:sp>
+        <p:nvSpPr>
+          <p:cNvPr id="28" name="Pentagon 27">
+            <a:extLst>
+              <a:ext uri="{FF2B5EF4-FFF2-40B4-BE49-F238E27FC236}">
+                <a16:creationId xmlns:a16="http://schemas.microsoft.com/office/drawing/2014/main" id="{8A2A196D-7AA6-5818-D3C7-C3A288B9E38B}"/>
+              </a:ext>
+            </a:extLst>
+          </p:cNvPr>
+          <p:cNvSpPr/>
+          <p:nvPr/>
+        </p:nvSpPr>
+        <p:spPr>
+          <a:xfrm>
+            <a:off x="8160099" y="3042278"/>
+            <a:ext cx="4477463" cy="3987705"/>
+          </a:xfrm>
+          <a:prstGeom prst="pentagon">
+            <a:avLst/>
+          </a:prstGeom>
+          <a:solidFill>
+            <a:schemeClr val="accent2">
+              <a:lumMod val="60000"/>
+              <a:lumOff val="40000"/>
+              <a:alpha val="16078"/>
+            </a:schemeClr>
+          </a:solidFill>
+          <a:ln>
+            <a:noFill/>
+          </a:ln>
+        </p:spPr>
+        <p:style>
+          <a:lnRef idx="2">
+            <a:schemeClr val="accent1">
+              <a:shade val="50000"/>
+            </a:schemeClr>
+          </a:lnRef>
+          <a:fillRef idx="1">
+            <a:schemeClr val="accent1"/>
+          </a:fillRef>
+          <a:effectRef idx="0">
+            <a:schemeClr val="accent1"/>
+          </a:effectRef>
+          <a:fontRef idx="minor">
+            <a:schemeClr val="lt1"/>
+          </a:fontRef>
+        </p:style>
+        <p:txBody>
+          <a:bodyPr rtlCol="0" anchor="ctr"/>
+          <a:lstStyle/>
+          <a:p>
+            <a:pPr algn="ctr"/>
+            <a:endParaRPr lang="en-US" dirty="0"/>
+          </a:p>
+        </p:txBody>
+      </p:sp>
+      <p:pic>
+        <p:nvPicPr>
+          <p:cNvPr id="30" name="Picture 14">
+            <a:extLst>
+              <a:ext uri="{FF2B5EF4-FFF2-40B4-BE49-F238E27FC236}">
+                <a16:creationId xmlns:a16="http://schemas.microsoft.com/office/drawing/2014/main" id="{9D44D9B2-B85A-20AA-C60C-73801843EEAB}"/>
+              </a:ext>
+            </a:extLst>
+          </p:cNvPr>
+          <p:cNvPicPr>
+            <a:picLocks noChangeAspect="1" noChangeArrowheads="1"/>
+          </p:cNvPicPr>
+          <p:nvPr/>
+        </p:nvPicPr>
+        <p:blipFill>
+          <a:blip r:embed="rId10">
+            <a:extLst>
+              <a:ext uri="{28A0092B-C50C-407E-A947-70E740481C1C}">
+                <a14:useLocalDpi xmlns:a14="http://schemas.microsoft.com/office/drawing/2010/main" val="0"/>
+              </a:ext>
+            </a:extLst>
+          </a:blip>
+          <a:srcRect/>
+          <a:stretch>
+            <a:fillRect/>
+          </a:stretch>
+        </p:blipFill>
+        <p:spPr bwMode="auto">
+          <a:xfrm>
+            <a:off x="9682524" y="4266998"/>
+            <a:ext cx="2194291" cy="2194291"/>
+          </a:xfrm>
+          <a:prstGeom prst="rect">
+            <a:avLst/>
+          </a:prstGeom>
+          <a:noFill/>
+          <a:extLst>
+            <a:ext uri="{909E8E84-426E-40DD-AFC4-6F175D3DCCD1}">
+              <a14:hiddenFill xmlns:a14="http://schemas.microsoft.com/office/drawing/2010/main">
+                <a:solidFill>
+                  <a:srgbClr val="FFFFFF"/>
+                </a:solidFill>
+              </a14:hiddenFill>
+            </a:ext>
+          </a:extLst>
+        </p:spPr>
+      </p:pic>
       <p:sp>
         <p:nvSpPr>
           <p:cNvPr id="31" name="TextBox 30">
@@ -4334,8 +4118,8 @@
           <p:nvPr/>
         </p:nvSpPr>
         <p:spPr>
-          <a:xfrm rot="2049841">
-            <a:off x="10450629" y="3311312"/>
+          <a:xfrm rot="2123925">
+            <a:off x="10401228" y="3259918"/>
             <a:ext cx="1978255" cy="461665"/>
           </a:xfrm>
           <a:prstGeom prst="rect">
@@ -4383,7 +4167,7 @@
           <p:nvPr/>
         </p:nvPicPr>
         <p:blipFill>
-          <a:blip r:embed="rId15">
+          <a:blip r:embed="rId11">
             <a:duotone>
               <a:prstClr val="black"/>
               <a:srgbClr val="FF1111">
@@ -4403,8 +4187,8 @@
         </p:blipFill>
         <p:spPr>
           <a:xfrm>
-            <a:off x="9870631" y="4595382"/>
-            <a:ext cx="1053044" cy="1390019"/>
+            <a:off x="1535560" y="3839119"/>
+            <a:ext cx="554847" cy="732398"/>
           </a:xfrm>
           <a:prstGeom prst="rect">
             <a:avLst/>
@@ -4421,7 +4205,8 @@
             </a:extLst>
           </p:cNvPr>
           <p:cNvCxnSpPr>
-            <a:stCxn id="30" idx="1"/>
+            <a:cxnSpLocks/>
+            <a:stCxn id="1033" idx="1"/>
             <a:endCxn id="1026" idx="3"/>
           </p:cNvCxnSpPr>
           <p:nvPr/>
@@ -4429,10 +4214,12 @@
         <p:spPr>
           <a:xfrm rot="10800000">
             <a:off x="6469782" y="2315792"/>
-            <a:ext cx="1821739" cy="1675759"/>
+            <a:ext cx="2041437" cy="2665113"/>
           </a:xfrm>
           <a:prstGeom prst="bentConnector3">
-            <a:avLst/>
+            <a:avLst>
+              <a:gd name="adj1" fmla="val 50000"/>
+            </a:avLst>
           </a:prstGeom>
           <a:ln w="28575">
             <a:solidFill>
@@ -4467,18 +4254,21 @@
             </a:extLst>
           </p:cNvPr>
           <p:cNvCxnSpPr>
-            <a:stCxn id="1038" idx="3"/>
+            <a:cxnSpLocks/>
+            <a:stCxn id="38" idx="3"/>
             <a:endCxn id="1026" idx="1"/>
           </p:cNvCxnSpPr>
           <p:nvPr/>
         </p:nvCxnSpPr>
         <p:spPr>
           <a:xfrm flipV="1">
-            <a:off x="3711388" y="2315791"/>
-            <a:ext cx="2010824" cy="1743620"/>
+            <a:off x="3720560" y="2315791"/>
+            <a:ext cx="2001652" cy="3122384"/>
           </a:xfrm>
           <a:prstGeom prst="bentConnector3">
-            <a:avLst/>
+            <a:avLst>
+              <a:gd name="adj1" fmla="val 45761"/>
+            </a:avLst>
           </a:prstGeom>
           <a:ln w="28575">
             <a:headEnd type="none" w="med" len="med"/>
@@ -4515,7 +4305,7 @@
           <p:nvPr/>
         </p:nvPicPr>
         <p:blipFill>
-          <a:blip r:embed="rId16">
+          <a:blip r:embed="rId12">
             <a:extLst>
               <a:ext uri="{28A0092B-C50C-407E-A947-70E740481C1C}">
                 <a14:useLocalDpi xmlns:a14="http://schemas.microsoft.com/office/drawing/2010/main" val="0"/>
@@ -4529,7 +4319,7 @@
         </p:blipFill>
         <p:spPr bwMode="auto">
           <a:xfrm>
-            <a:off x="8291980" y="3296540"/>
+            <a:off x="10032584" y="5168250"/>
             <a:ext cx="377258" cy="377258"/>
           </a:xfrm>
           <a:prstGeom prst="rect">
@@ -4562,7 +4352,7 @@
           <p:nvPr/>
         </p:nvPicPr>
         <p:blipFill>
-          <a:blip r:embed="rId17">
+          <a:blip r:embed="rId13">
             <a:extLst>
               <a:ext uri="{28A0092B-C50C-407E-A947-70E740481C1C}">
                 <a14:useLocalDpi xmlns:a14="http://schemas.microsoft.com/office/drawing/2010/main" val="0"/>
@@ -4576,7 +4366,7 @@
         </p:blipFill>
         <p:spPr bwMode="auto">
           <a:xfrm>
-            <a:off x="8697054" y="3303804"/>
+            <a:off x="10437659" y="5175515"/>
             <a:ext cx="377259" cy="377259"/>
           </a:xfrm>
           <a:prstGeom prst="rect">
@@ -4656,7 +4446,7 @@
           <p:nvPr/>
         </p:nvPicPr>
         <p:blipFill>
-          <a:blip r:embed="rId18">
+          <a:blip r:embed="rId14">
             <a:extLst>
               <a:ext uri="{28A0092B-C50C-407E-A947-70E740481C1C}">
                 <a14:useLocalDpi xmlns:a14="http://schemas.microsoft.com/office/drawing/2010/main" val="0"/>
@@ -4682,44 +4472,333 @@
           </a:ln>
         </p:spPr>
       </p:pic>
+      <p:sp>
+        <p:nvSpPr>
+          <p:cNvPr id="1029" name="CaixaDeTexto 1028">
+            <a:extLst>
+              <a:ext uri="{FF2B5EF4-FFF2-40B4-BE49-F238E27FC236}">
+                <a16:creationId xmlns:a16="http://schemas.microsoft.com/office/drawing/2014/main" id="{C7F932C0-D50D-D4B7-6FFD-9783F5E79228}"/>
+              </a:ext>
+            </a:extLst>
+          </p:cNvPr>
+          <p:cNvSpPr txBox="1"/>
+          <p:nvPr/>
+        </p:nvSpPr>
+        <p:spPr>
+          <a:xfrm>
+            <a:off x="2841674" y="2996418"/>
+            <a:ext cx="184731" cy="369332"/>
+          </a:xfrm>
+          <a:prstGeom prst="rect">
+            <a:avLst/>
+          </a:prstGeom>
+          <a:noFill/>
+        </p:spPr>
+        <p:txBody>
+          <a:bodyPr wrap="none" rtlCol="0">
+            <a:spAutoFit/>
+          </a:bodyPr>
+          <a:lstStyle/>
+          <a:p>
+            <a:endParaRPr lang="pt-BR" dirty="0"/>
+          </a:p>
+        </p:txBody>
+      </p:sp>
+      <p:pic>
+        <p:nvPicPr>
+          <p:cNvPr id="1033" name="Imagem 1032">
+            <a:extLst>
+              <a:ext uri="{FF2B5EF4-FFF2-40B4-BE49-F238E27FC236}">
+                <a16:creationId xmlns:a16="http://schemas.microsoft.com/office/drawing/2014/main" id="{77CD88E3-F543-91B6-CD24-D931022320B4}"/>
+              </a:ext>
+            </a:extLst>
+          </p:cNvPr>
+          <p:cNvPicPr>
+            <a:picLocks noChangeAspect="1"/>
+          </p:cNvPicPr>
+          <p:nvPr/>
+        </p:nvPicPr>
+        <p:blipFill>
+          <a:blip r:embed="rId15">
+            <a:extLst>
+              <a:ext uri="{28A0092B-C50C-407E-A947-70E740481C1C}">
+                <a14:useLocalDpi xmlns:a14="http://schemas.microsoft.com/office/drawing/2010/main" val="0"/>
+              </a:ext>
+            </a:extLst>
+          </a:blip>
+          <a:stretch>
+            <a:fillRect/>
+          </a:stretch>
+        </p:blipFill>
+        <p:spPr>
+          <a:xfrm>
+            <a:off x="8511218" y="4236605"/>
+            <a:ext cx="1488598" cy="1488598"/>
+          </a:xfrm>
+          <a:prstGeom prst="rect">
+            <a:avLst/>
+          </a:prstGeom>
+        </p:spPr>
+      </p:pic>
+      <p:pic>
+        <p:nvPicPr>
+          <p:cNvPr id="1037" name="Imagem 1036">
+            <a:extLst>
+              <a:ext uri="{FF2B5EF4-FFF2-40B4-BE49-F238E27FC236}">
+                <a16:creationId xmlns:a16="http://schemas.microsoft.com/office/drawing/2014/main" id="{76E70F41-34B9-4B68-DA20-B4FE8DE7D137}"/>
+              </a:ext>
+            </a:extLst>
+          </p:cNvPr>
+          <p:cNvPicPr>
+            <a:picLocks noChangeAspect="1"/>
+          </p:cNvPicPr>
+          <p:nvPr/>
+        </p:nvPicPr>
+        <p:blipFill>
+          <a:blip r:embed="rId16">
+            <a:extLst>
+              <a:ext uri="{28A0092B-C50C-407E-A947-70E740481C1C}">
+                <a14:useLocalDpi xmlns:a14="http://schemas.microsoft.com/office/drawing/2010/main" val="0"/>
+              </a:ext>
+            </a:extLst>
+          </a:blip>
+          <a:stretch>
+            <a:fillRect/>
+          </a:stretch>
+        </p:blipFill>
+        <p:spPr>
+          <a:xfrm>
+            <a:off x="2197451" y="5207158"/>
+            <a:ext cx="377314" cy="377314"/>
+          </a:xfrm>
+          <a:prstGeom prst="rect">
+            <a:avLst/>
+          </a:prstGeom>
+        </p:spPr>
+      </p:pic>
+      <p:pic>
+        <p:nvPicPr>
+          <p:cNvPr id="1041" name="Imagem 1040">
+            <a:extLst>
+              <a:ext uri="{FF2B5EF4-FFF2-40B4-BE49-F238E27FC236}">
+                <a16:creationId xmlns:a16="http://schemas.microsoft.com/office/drawing/2014/main" id="{737FFE73-16BF-130A-16A8-581638B85368}"/>
+              </a:ext>
+            </a:extLst>
+          </p:cNvPr>
+          <p:cNvPicPr>
+            <a:picLocks noChangeAspect="1"/>
+          </p:cNvPicPr>
+          <p:nvPr/>
+        </p:nvPicPr>
+        <p:blipFill>
+          <a:blip r:embed="rId17">
+            <a:extLst>
+              <a:ext uri="{28A0092B-C50C-407E-A947-70E740481C1C}">
+                <a14:useLocalDpi xmlns:a14="http://schemas.microsoft.com/office/drawing/2010/main" val="0"/>
+              </a:ext>
+            </a:extLst>
+          </a:blip>
+          <a:stretch>
+            <a:fillRect/>
+          </a:stretch>
+        </p:blipFill>
+        <p:spPr>
+          <a:xfrm>
+            <a:off x="2197451" y="4796649"/>
+            <a:ext cx="377314" cy="377314"/>
+          </a:xfrm>
+          <a:prstGeom prst="rect">
+            <a:avLst/>
+          </a:prstGeom>
+        </p:spPr>
+      </p:pic>
+      <p:pic>
+        <p:nvPicPr>
+          <p:cNvPr id="34" name="Picture 22">
+            <a:extLst>
+              <a:ext uri="{FF2B5EF4-FFF2-40B4-BE49-F238E27FC236}">
+                <a16:creationId xmlns:a16="http://schemas.microsoft.com/office/drawing/2014/main" id="{C0BF6D64-34E5-9D16-2CAA-0AF265A67B79}"/>
+              </a:ext>
+            </a:extLst>
+          </p:cNvPr>
+          <p:cNvPicPr>
+            <a:picLocks noChangeAspect="1" noChangeArrowheads="1"/>
+          </p:cNvPicPr>
+          <p:nvPr/>
+        </p:nvPicPr>
+        <p:blipFill>
+          <a:blip r:embed="rId12">
+            <a:extLst>
+              <a:ext uri="{28A0092B-C50C-407E-A947-70E740481C1C}">
+                <a14:useLocalDpi xmlns:a14="http://schemas.microsoft.com/office/drawing/2010/main" val="0"/>
+              </a:ext>
+            </a:extLst>
+          </a:blip>
+          <a:srcRect/>
+          <a:stretch>
+            <a:fillRect/>
+          </a:stretch>
+        </p:blipFill>
+        <p:spPr bwMode="auto">
+          <a:xfrm>
+            <a:off x="9119062" y="4577034"/>
+            <a:ext cx="279448" cy="279448"/>
+          </a:xfrm>
+          <a:prstGeom prst="rect">
+            <a:avLst/>
+          </a:prstGeom>
+          <a:noFill/>
+          <a:extLst>
+            <a:ext uri="{909E8E84-426E-40DD-AFC4-6F175D3DCCD1}">
+              <a14:hiddenFill xmlns:a14="http://schemas.microsoft.com/office/drawing/2010/main">
+                <a:solidFill>
+                  <a:srgbClr val="FFFFFF"/>
+                </a:solidFill>
+              </a14:hiddenFill>
+            </a:ext>
+          </a:extLst>
+        </p:spPr>
+      </p:pic>
+      <p:pic>
+        <p:nvPicPr>
+          <p:cNvPr id="35" name="Picture 24">
+            <a:extLst>
+              <a:ext uri="{FF2B5EF4-FFF2-40B4-BE49-F238E27FC236}">
+                <a16:creationId xmlns:a16="http://schemas.microsoft.com/office/drawing/2014/main" id="{FF8F000C-F854-B1C3-646C-F8608E2C1D87}"/>
+              </a:ext>
+            </a:extLst>
+          </p:cNvPr>
+          <p:cNvPicPr>
+            <a:picLocks noChangeAspect="1" noChangeArrowheads="1"/>
+          </p:cNvPicPr>
+          <p:nvPr/>
+        </p:nvPicPr>
+        <p:blipFill>
+          <a:blip r:embed="rId13">
+            <a:extLst>
+              <a:ext uri="{28A0092B-C50C-407E-A947-70E740481C1C}">
+                <a14:useLocalDpi xmlns:a14="http://schemas.microsoft.com/office/drawing/2010/main" val="0"/>
+              </a:ext>
+            </a:extLst>
+          </a:blip>
+          <a:srcRect/>
+          <a:stretch>
+            <a:fillRect/>
+          </a:stretch>
+        </p:blipFill>
+        <p:spPr bwMode="auto">
+          <a:xfrm>
+            <a:off x="9119061" y="4933363"/>
+            <a:ext cx="279449" cy="279449"/>
+          </a:xfrm>
+          <a:prstGeom prst="rect">
+            <a:avLst/>
+          </a:prstGeom>
+          <a:noFill/>
+          <a:extLst>
+            <a:ext uri="{909E8E84-426E-40DD-AFC4-6F175D3DCCD1}">
+              <a14:hiddenFill xmlns:a14="http://schemas.microsoft.com/office/drawing/2010/main">
+                <a:solidFill>
+                  <a:srgbClr val="FFFFFF"/>
+                </a:solidFill>
+              </a14:hiddenFill>
+            </a:ext>
+          </a:extLst>
+        </p:spPr>
+      </p:pic>
+      <p:sp>
+        <p:nvSpPr>
+          <p:cNvPr id="1056" name="Hexagon 1055">
+            <a:extLst>
+              <a:ext uri="{FF2B5EF4-FFF2-40B4-BE49-F238E27FC236}">
+                <a16:creationId xmlns:a16="http://schemas.microsoft.com/office/drawing/2014/main" id="{B7B2D785-AA68-85C3-CE16-93D0A0DE94B5}"/>
+              </a:ext>
+            </a:extLst>
+          </p:cNvPr>
+          <p:cNvSpPr/>
+          <p:nvPr/>
+        </p:nvSpPr>
+        <p:spPr>
+          <a:xfrm rot="1503972">
+            <a:off x="9957133" y="-74401"/>
+            <a:ext cx="3466506" cy="2700287"/>
+          </a:xfrm>
+          <a:prstGeom prst="hexagon">
+            <a:avLst/>
+          </a:prstGeom>
+          <a:solidFill>
+            <a:srgbClr val="FFC000">
+              <a:alpha val="21961"/>
+            </a:srgbClr>
+          </a:solidFill>
+          <a:ln>
+            <a:noFill/>
+          </a:ln>
+        </p:spPr>
+        <p:style>
+          <a:lnRef idx="2">
+            <a:schemeClr val="accent4">
+              <a:shade val="50000"/>
+            </a:schemeClr>
+          </a:lnRef>
+          <a:fillRef idx="1">
+            <a:schemeClr val="accent4"/>
+          </a:fillRef>
+          <a:effectRef idx="0">
+            <a:schemeClr val="accent4"/>
+          </a:effectRef>
+          <a:fontRef idx="minor">
+            <a:schemeClr val="lt1"/>
+          </a:fontRef>
+        </p:style>
+        <p:txBody>
+          <a:bodyPr rtlCol="0" anchor="ctr"/>
+          <a:lstStyle/>
+          <a:p>
+            <a:pPr algn="ctr"/>
+            <a:endParaRPr lang="en-US" dirty="0"/>
+          </a:p>
+        </p:txBody>
+      </p:sp>
       <p:cxnSp>
         <p:nvCxnSpPr>
-          <p:cNvPr id="29" name="Connector: Elbow 19">
-            <a:extLst>
-              <a:ext uri="{FF2B5EF4-FFF2-40B4-BE49-F238E27FC236}">
-                <a16:creationId xmlns:a16="http://schemas.microsoft.com/office/drawing/2014/main" id="{071EB565-DD6A-4E44-F087-EA8E59572116}"/>
+          <p:cNvPr id="1060" name="Connector: Elbow 1059">
+            <a:extLst>
+              <a:ext uri="{FF2B5EF4-FFF2-40B4-BE49-F238E27FC236}">
+                <a16:creationId xmlns:a16="http://schemas.microsoft.com/office/drawing/2014/main" id="{848BCEFA-EE30-1AD9-345B-79605F9CBFE9}"/>
               </a:ext>
             </a:extLst>
           </p:cNvPr>
           <p:cNvCxnSpPr>
             <a:cxnSpLocks/>
-            <a:stCxn id="1034" idx="0"/>
-            <a:endCxn id="61" idx="2"/>
+            <a:stCxn id="1035" idx="3"/>
           </p:cNvCxnSpPr>
           <p:nvPr/>
         </p:nvCxnSpPr>
         <p:spPr>
-          <a:xfrm rot="16200000" flipV="1">
-            <a:off x="5910311" y="736067"/>
-            <a:ext cx="371373" cy="2"/>
+          <a:xfrm>
+            <a:off x="8075384" y="1077610"/>
+            <a:ext cx="2469952" cy="168303"/>
           </a:xfrm>
           <a:prstGeom prst="bentConnector3">
-            <a:avLst>
-              <a:gd name="adj1" fmla="val 50000"/>
-            </a:avLst>
+            <a:avLst/>
           </a:prstGeom>
-          <a:ln w="19050">
-            <a:prstDash val="sysDash"/>
+          <a:ln w="28575">
+            <a:solidFill>
+              <a:schemeClr val="accent6"/>
+            </a:solidFill>
+            <a:headEnd type="none" w="med" len="med"/>
+            <a:tailEnd type="arrow" w="med" len="med"/>
           </a:ln>
         </p:spPr>
         <p:style>
-          <a:lnRef idx="1">
+          <a:lnRef idx="3">
             <a:schemeClr val="accent6"/>
           </a:lnRef>
           <a:fillRef idx="0">
             <a:schemeClr val="accent6"/>
           </a:fillRef>
-          <a:effectRef idx="0">
+          <a:effectRef idx="2">
             <a:schemeClr val="accent6"/>
           </a:effectRef>
           <a:fontRef idx="minor">
@@ -4729,178 +4808,49 @@
       </p:cxnSp>
       <p:pic>
         <p:nvPicPr>
-          <p:cNvPr id="61" name="Imagem 60">
-            <a:extLst>
-              <a:ext uri="{FF2B5EF4-FFF2-40B4-BE49-F238E27FC236}">
-                <a16:creationId xmlns:a16="http://schemas.microsoft.com/office/drawing/2014/main" id="{6E92B042-1578-DBC4-2B1D-77AA8620D7B8}"/>
+          <p:cNvPr id="1062" name="Picture 2" descr="Hubspot - Free logo icons">
+            <a:extLst>
+              <a:ext uri="{FF2B5EF4-FFF2-40B4-BE49-F238E27FC236}">
+                <a16:creationId xmlns:a16="http://schemas.microsoft.com/office/drawing/2014/main" id="{A681391D-4C8D-4FAF-B025-F6C67ECFE318}"/>
               </a:ext>
             </a:extLst>
           </p:cNvPr>
           <p:cNvPicPr>
-            <a:picLocks noChangeAspect="1"/>
+            <a:picLocks noChangeAspect="1" noChangeArrowheads="1"/>
           </p:cNvPicPr>
           <p:nvPr/>
         </p:nvPicPr>
         <p:blipFill>
-          <a:blip r:embed="rId19">
+          <a:blip r:embed="rId18">
             <a:extLst>
               <a:ext uri="{28A0092B-C50C-407E-A947-70E740481C1C}">
                 <a14:useLocalDpi xmlns:a14="http://schemas.microsoft.com/office/drawing/2010/main" val="0"/>
               </a:ext>
             </a:extLst>
           </a:blip>
+          <a:srcRect/>
           <a:stretch>
             <a:fillRect/>
           </a:stretch>
         </p:blipFill>
-        <p:spPr>
+        <p:spPr bwMode="auto">
           <a:xfrm>
-            <a:off x="5888343" y="135076"/>
-            <a:ext cx="415305" cy="415305"/>
-          </a:xfrm>
-          <a:prstGeom prst="rect">
-            <a:avLst/>
-          </a:prstGeom>
-        </p:spPr>
-      </p:pic>
-      <p:sp>
-        <p:nvSpPr>
-          <p:cNvPr id="1029" name="CaixaDeTexto 1028">
-            <a:extLst>
-              <a:ext uri="{FF2B5EF4-FFF2-40B4-BE49-F238E27FC236}">
-                <a16:creationId xmlns:a16="http://schemas.microsoft.com/office/drawing/2014/main" id="{C7F932C0-D50D-D4B7-6FFD-9783F5E79228}"/>
-              </a:ext>
-            </a:extLst>
-          </p:cNvPr>
-          <p:cNvSpPr txBox="1"/>
-          <p:nvPr/>
-        </p:nvSpPr>
-        <p:spPr>
-          <a:xfrm>
-            <a:off x="2841674" y="2996418"/>
-            <a:ext cx="184731" cy="369332"/>
+            <a:off x="10613234" y="515824"/>
+            <a:ext cx="1365646" cy="1365646"/>
           </a:xfrm>
           <a:prstGeom prst="rect">
             <a:avLst/>
           </a:prstGeom>
           <a:noFill/>
-        </p:spPr>
-        <p:txBody>
-          <a:bodyPr wrap="none" rtlCol="0">
-            <a:spAutoFit/>
-          </a:bodyPr>
-          <a:lstStyle/>
-          <a:p>
-            <a:endParaRPr lang="pt-BR" dirty="0"/>
-          </a:p>
-        </p:txBody>
-      </p:sp>
-      <p:pic>
-        <p:nvPicPr>
-          <p:cNvPr id="1033" name="Imagem 1032">
-            <a:extLst>
-              <a:ext uri="{FF2B5EF4-FFF2-40B4-BE49-F238E27FC236}">
-                <a16:creationId xmlns:a16="http://schemas.microsoft.com/office/drawing/2014/main" id="{77CD88E3-F543-91B6-CD24-D931022320B4}"/>
-              </a:ext>
-            </a:extLst>
-          </p:cNvPr>
-          <p:cNvPicPr>
-            <a:picLocks noChangeAspect="1"/>
-          </p:cNvPicPr>
-          <p:nvPr/>
-        </p:nvPicPr>
-        <p:blipFill>
-          <a:blip r:embed="rId20">
-            <a:extLst>
-              <a:ext uri="{28A0092B-C50C-407E-A947-70E740481C1C}">
-                <a14:useLocalDpi xmlns:a14="http://schemas.microsoft.com/office/drawing/2010/main" val="0"/>
-              </a:ext>
-            </a:extLst>
-          </a:blip>
-          <a:stretch>
-            <a:fillRect/>
-          </a:stretch>
-        </p:blipFill>
-        <p:spPr>
-          <a:xfrm>
-            <a:off x="8496905" y="4617036"/>
-            <a:ext cx="538425" cy="538425"/>
-          </a:xfrm>
-          <a:prstGeom prst="rect">
-            <a:avLst/>
-          </a:prstGeom>
-        </p:spPr>
-      </p:pic>
-      <p:pic>
-        <p:nvPicPr>
-          <p:cNvPr id="1037" name="Imagem 1036">
-            <a:extLst>
-              <a:ext uri="{FF2B5EF4-FFF2-40B4-BE49-F238E27FC236}">
-                <a16:creationId xmlns:a16="http://schemas.microsoft.com/office/drawing/2014/main" id="{76E70F41-34B9-4B68-DA20-B4FE8DE7D137}"/>
-              </a:ext>
-            </a:extLst>
-          </p:cNvPr>
-          <p:cNvPicPr>
-            <a:picLocks noChangeAspect="1"/>
-          </p:cNvPicPr>
-          <p:nvPr/>
-        </p:nvPicPr>
-        <p:blipFill>
-          <a:blip r:embed="rId21">
-            <a:extLst>
-              <a:ext uri="{28A0092B-C50C-407E-A947-70E740481C1C}">
-                <a14:useLocalDpi xmlns:a14="http://schemas.microsoft.com/office/drawing/2010/main" val="0"/>
-              </a:ext>
-            </a:extLst>
-          </a:blip>
-          <a:stretch>
-            <a:fillRect/>
-          </a:stretch>
-        </p:blipFill>
-        <p:spPr>
-          <a:xfrm>
-            <a:off x="2680862" y="3400781"/>
-            <a:ext cx="377314" cy="377314"/>
-          </a:xfrm>
-          <a:prstGeom prst="rect">
-            <a:avLst/>
-          </a:prstGeom>
-        </p:spPr>
-      </p:pic>
-      <p:pic>
-        <p:nvPicPr>
-          <p:cNvPr id="1041" name="Imagem 1040">
-            <a:extLst>
-              <a:ext uri="{FF2B5EF4-FFF2-40B4-BE49-F238E27FC236}">
-                <a16:creationId xmlns:a16="http://schemas.microsoft.com/office/drawing/2014/main" id="{737FFE73-16BF-130A-16A8-581638B85368}"/>
-              </a:ext>
-            </a:extLst>
-          </p:cNvPr>
-          <p:cNvPicPr>
-            <a:picLocks noChangeAspect="1"/>
-          </p:cNvPicPr>
-          <p:nvPr/>
-        </p:nvPicPr>
-        <p:blipFill>
-          <a:blip r:embed="rId22">
-            <a:extLst>
-              <a:ext uri="{28A0092B-C50C-407E-A947-70E740481C1C}">
-                <a14:useLocalDpi xmlns:a14="http://schemas.microsoft.com/office/drawing/2010/main" val="0"/>
-              </a:ext>
-            </a:extLst>
-          </a:blip>
-          <a:stretch>
-            <a:fillRect/>
-          </a:stretch>
-        </p:blipFill>
-        <p:spPr>
-          <a:xfrm>
-            <a:off x="2320910" y="3364401"/>
-            <a:ext cx="377314" cy="377314"/>
-          </a:xfrm>
-          <a:prstGeom prst="rect">
-            <a:avLst/>
-          </a:prstGeom>
+          <a:extLst>
+            <a:ext uri="{909E8E84-426E-40DD-AFC4-6F175D3DCCD1}">
+              <a14:hiddenFill xmlns:a14="http://schemas.microsoft.com/office/drawing/2010/main">
+                <a:solidFill>
+                  <a:srgbClr val="FFFFFF"/>
+                </a:solidFill>
+              </a14:hiddenFill>
+            </a:ext>
+          </a:extLst>
         </p:spPr>
       </p:pic>
     </p:spTree>
@@ -5212,15 +5162,6 @@
 </file>
 
 <file path=customXml/item1.xml><?xml version="1.0" encoding="utf-8"?>
-<?mso-contentType ?>
-<FormTemplates xmlns="http://schemas.microsoft.com/sharepoint/v3/contenttype/forms">
-  <Display>DocumentLibraryForm</Display>
-  <Edit>DocumentLibraryForm</Edit>
-  <New>DocumentLibraryForm</New>
-</FormTemplates>
-</file>
-
-<file path=customXml/item2.xml><?xml version="1.0" encoding="utf-8"?>
 <ct:contentTypeSchema xmlns:ct="http://schemas.microsoft.com/office/2006/metadata/contentType" xmlns:ma="http://schemas.microsoft.com/office/2006/metadata/properties/metaAttributes" ct:_="" ma:_="" ma:contentTypeName="Document" ma:contentTypeID="0x0101007ACFDD1B2CAD7546B60E55C07A86393C" ma:contentTypeVersion="8" ma:contentTypeDescription="Create a new document." ma:contentTypeScope="" ma:versionID="5d6d35b7c4b9d7d0b0b50153092a7135">
   <xsd:schema xmlns:xsd="http://www.w3.org/2001/XMLSchema" xmlns:xs="http://www.w3.org/2001/XMLSchema" xmlns:p="http://schemas.microsoft.com/office/2006/metadata/properties" xmlns:ns2="93df9749-2e2e-4b03-97b6-02f28a4f49b8" xmlns:ns3="baec3224-d2f5-41eb-8c54-338f5702dece" targetNamespace="http://schemas.microsoft.com/office/2006/metadata/properties" ma:root="true" ma:fieldsID="aabd4abe893933e4b2ec8d888e542e07" ns2:_="" ns3:_="">
     <xsd:import namespace="93df9749-2e2e-4b03-97b6-02f28a4f49b8"/>
@@ -5397,15 +5338,16 @@
 </ct:contentTypeSchema>
 </file>
 
-<file path=customXml/itemProps1.xml><?xml version="1.0" encoding="utf-8"?>
-<ds:datastoreItem xmlns:ds="http://schemas.openxmlformats.org/officeDocument/2006/customXml" ds:itemID="{0F87556E-BD60-49BB-A940-874BF0804AF5}">
-  <ds:schemaRefs>
-    <ds:schemaRef ds:uri="http://schemas.microsoft.com/sharepoint/v3/contenttype/forms"/>
-  </ds:schemaRefs>
-</ds:datastoreItem>
+<file path=customXml/item2.xml><?xml version="1.0" encoding="utf-8"?>
+<?mso-contentType ?>
+<FormTemplates xmlns="http://schemas.microsoft.com/sharepoint/v3/contenttype/forms">
+  <Display>DocumentLibraryForm</Display>
+  <Edit>DocumentLibraryForm</Edit>
+  <New>DocumentLibraryForm</New>
+</FormTemplates>
 </file>
 
-<file path=customXml/itemProps2.xml><?xml version="1.0" encoding="utf-8"?>
+<file path=customXml/itemProps1.xml><?xml version="1.0" encoding="utf-8"?>
 <ds:datastoreItem xmlns:ds="http://schemas.openxmlformats.org/officeDocument/2006/customXml" ds:itemID="{37934C53-9D37-4ACF-8F44-22FD83A0E93C}">
   <ds:schemaRefs>
     <ds:schemaRef ds:uri="http://schemas.microsoft.com/office/2006/metadata/contentType"/>
@@ -5422,4 +5364,12 @@
     <ds:schemaRef ds:uri="http://schemas.microsoft.com/internal/obd"/>
   </ds:schemaRefs>
 </ds:datastoreItem>
+</file>
+
+<file path=customXml/itemProps2.xml><?xml version="1.0" encoding="utf-8"?>
+<ds:datastoreItem xmlns:ds="http://schemas.openxmlformats.org/officeDocument/2006/customXml" ds:itemID="{0F87556E-BD60-49BB-A940-874BF0804AF5}">
+  <ds:schemaRefs>
+    <ds:schemaRef ds:uri="http://schemas.microsoft.com/sharepoint/v3/contenttype/forms"/>
+  </ds:schemaRefs>
+</ds:datastoreItem>
 </file>
</xml_diff>